<commit_message>
Updates to lecture slides
</commit_message>
<xml_diff>
--- a/slides/CS649-Fall2017-MessagingAndMicroservices.pptx
+++ b/slides/CS649-Fall2017-MessagingAndMicroservices.pptx
@@ -5,7 +5,7 @@
     <p:sldMasterId id="2147483648" r:id="rId1"/>
   </p:sldMasterIdLst>
   <p:notesMasterIdLst>
-    <p:notesMasterId r:id="rId35"/>
+    <p:notesMasterId r:id="rId36"/>
   </p:notesMasterIdLst>
   <p:sldIdLst>
     <p:sldId id="324" r:id="rId2"/>
@@ -13,34 +13,35 @@
     <p:sldId id="386" r:id="rId4"/>
     <p:sldId id="388" r:id="rId5"/>
     <p:sldId id="389" r:id="rId6"/>
-    <p:sldId id="326" r:id="rId7"/>
-    <p:sldId id="384" r:id="rId8"/>
-    <p:sldId id="327" r:id="rId9"/>
-    <p:sldId id="328" r:id="rId10"/>
-    <p:sldId id="329" r:id="rId11"/>
-    <p:sldId id="330" r:id="rId12"/>
-    <p:sldId id="382" r:id="rId13"/>
-    <p:sldId id="331" r:id="rId14"/>
-    <p:sldId id="379" r:id="rId15"/>
-    <p:sldId id="381" r:id="rId16"/>
-    <p:sldId id="333" r:id="rId17"/>
-    <p:sldId id="334" r:id="rId18"/>
-    <p:sldId id="335" r:id="rId19"/>
-    <p:sldId id="336" r:id="rId20"/>
-    <p:sldId id="377" r:id="rId21"/>
-    <p:sldId id="374" r:id="rId22"/>
-    <p:sldId id="375" r:id="rId23"/>
-    <p:sldId id="376" r:id="rId24"/>
-    <p:sldId id="380" r:id="rId25"/>
-    <p:sldId id="337" r:id="rId26"/>
-    <p:sldId id="338" r:id="rId27"/>
-    <p:sldId id="339" r:id="rId28"/>
-    <p:sldId id="340" r:id="rId29"/>
-    <p:sldId id="341" r:id="rId30"/>
-    <p:sldId id="342" r:id="rId31"/>
-    <p:sldId id="343" r:id="rId32"/>
-    <p:sldId id="344" r:id="rId33"/>
-    <p:sldId id="367" r:id="rId34"/>
+    <p:sldId id="390" r:id="rId7"/>
+    <p:sldId id="326" r:id="rId8"/>
+    <p:sldId id="384" r:id="rId9"/>
+    <p:sldId id="327" r:id="rId10"/>
+    <p:sldId id="328" r:id="rId11"/>
+    <p:sldId id="329" r:id="rId12"/>
+    <p:sldId id="330" r:id="rId13"/>
+    <p:sldId id="382" r:id="rId14"/>
+    <p:sldId id="331" r:id="rId15"/>
+    <p:sldId id="379" r:id="rId16"/>
+    <p:sldId id="381" r:id="rId17"/>
+    <p:sldId id="333" r:id="rId18"/>
+    <p:sldId id="334" r:id="rId19"/>
+    <p:sldId id="335" r:id="rId20"/>
+    <p:sldId id="336" r:id="rId21"/>
+    <p:sldId id="377" r:id="rId22"/>
+    <p:sldId id="374" r:id="rId23"/>
+    <p:sldId id="375" r:id="rId24"/>
+    <p:sldId id="376" r:id="rId25"/>
+    <p:sldId id="380" r:id="rId26"/>
+    <p:sldId id="337" r:id="rId27"/>
+    <p:sldId id="338" r:id="rId28"/>
+    <p:sldId id="339" r:id="rId29"/>
+    <p:sldId id="340" r:id="rId30"/>
+    <p:sldId id="341" r:id="rId31"/>
+    <p:sldId id="342" r:id="rId32"/>
+    <p:sldId id="343" r:id="rId33"/>
+    <p:sldId id="344" r:id="rId34"/>
+    <p:sldId id="367" r:id="rId35"/>
   </p:sldIdLst>
   <p:sldSz cx="12192000" cy="6858000"/>
   <p:notesSz cx="6858000" cy="9144000"/>
@@ -1646,43 +1647,6 @@
   <dgm:ptLst>
     <dgm:pt modelId="{2BF771CB-24E5-BE43-9E0C-43C2A194A419}" type="doc">
       <dgm:prSet loTypeId="urn:microsoft.com/office/officeart/2005/8/layout/vList5" loCatId="list" qsTypeId="urn:microsoft.com/office/officeart/2005/8/quickstyle/simple4" qsCatId="simple" csTypeId="urn:microsoft.com/office/officeart/2005/8/colors/accent1_2" csCatId="accent1" phldr="1"/>
-      <dgm:spPr/>
-      <dgm:t>
-        <a:bodyPr/>
-        <a:lstStyle/>
-        <a:p>
-          <a:endParaRPr lang="en-US"/>
-        </a:p>
-      </dgm:t>
-    </dgm:pt>
-    <dgm:pt modelId="{BB4675C8-DDF0-A049-B1CE-8F4BCACA70AF}">
-      <dgm:prSet/>
-      <dgm:spPr/>
-      <dgm:t>
-        <a:bodyPr/>
-        <a:lstStyle/>
-        <a:p>
-          <a:pPr rtl="0"/>
-          <a:r>
-            <a:rPr lang="en-US" dirty="0" smtClean="0"/>
-            <a:t>Two main parts</a:t>
-          </a:r>
-        </a:p>
-      </dgm:t>
-    </dgm:pt>
-    <dgm:pt modelId="{610E9004-E1FD-8245-AAB8-792EF7BAEA25}" type="parTrans" cxnId="{B16A84A2-BE17-C34D-BD32-300826A4578F}">
-      <dgm:prSet/>
-      <dgm:spPr/>
-      <dgm:t>
-        <a:bodyPr/>
-        <a:lstStyle/>
-        <a:p>
-          <a:endParaRPr lang="en-US"/>
-        </a:p>
-      </dgm:t>
-    </dgm:pt>
-    <dgm:pt modelId="{CC2BD989-BA3E-2542-805C-56DCC3DABB7B}" type="sibTrans" cxnId="{B16A84A2-BE17-C34D-BD32-300826A4578F}">
-      <dgm:prSet/>
       <dgm:spPr/>
       <dgm:t>
         <a:bodyPr/>
@@ -1920,120 +1884,6 @@
         </a:p>
       </dgm:t>
     </dgm:pt>
-    <dgm:pt modelId="{2B967830-8F2C-3D40-B134-EC2E20345CB8}">
-      <dgm:prSet/>
-      <dgm:spPr/>
-      <dgm:t>
-        <a:bodyPr/>
-        <a:lstStyle/>
-        <a:p>
-          <a:pPr rtl="0"/>
-          <a:r>
-            <a:rPr lang="en-US" dirty="0" smtClean="0"/>
-            <a:t>Exchange</a:t>
-          </a:r>
-          <a:endParaRPr lang="en-US" dirty="0"/>
-        </a:p>
-      </dgm:t>
-    </dgm:pt>
-    <dgm:pt modelId="{7745EFFD-6757-A042-90ED-0FD4CAB67D95}" type="parTrans" cxnId="{9AD8804A-E2C3-9341-A2C6-AC6E3A3ADD5C}">
-      <dgm:prSet/>
-      <dgm:spPr/>
-      <dgm:t>
-        <a:bodyPr/>
-        <a:lstStyle/>
-        <a:p>
-          <a:endParaRPr lang="en-US"/>
-        </a:p>
-      </dgm:t>
-    </dgm:pt>
-    <dgm:pt modelId="{D2FD852A-4C5B-704B-815F-ED6B12E00609}" type="sibTrans" cxnId="{9AD8804A-E2C3-9341-A2C6-AC6E3A3ADD5C}">
-      <dgm:prSet/>
-      <dgm:spPr/>
-      <dgm:t>
-        <a:bodyPr/>
-        <a:lstStyle/>
-        <a:p>
-          <a:endParaRPr lang="en-US"/>
-        </a:p>
-      </dgm:t>
-    </dgm:pt>
-    <dgm:pt modelId="{F56B1848-931C-5B4A-AB6E-0FAF95AF2142}">
-      <dgm:prSet/>
-      <dgm:spPr/>
-      <dgm:t>
-        <a:bodyPr/>
-        <a:lstStyle/>
-        <a:p>
-          <a:pPr rtl="0"/>
-          <a:r>
-            <a:rPr lang="en-US" dirty="0" smtClean="0"/>
-            <a:t>Message Queue</a:t>
-          </a:r>
-          <a:endParaRPr lang="en-US" dirty="0"/>
-        </a:p>
-      </dgm:t>
-    </dgm:pt>
-    <dgm:pt modelId="{9E31E1BF-4267-2C46-9C69-DE56F0AB17DA}" type="parTrans" cxnId="{1170C7CC-FE05-B343-ADEA-FDC51C15F8B7}">
-      <dgm:prSet/>
-      <dgm:spPr/>
-      <dgm:t>
-        <a:bodyPr/>
-        <a:lstStyle/>
-        <a:p>
-          <a:endParaRPr lang="en-US"/>
-        </a:p>
-      </dgm:t>
-    </dgm:pt>
-    <dgm:pt modelId="{BD61E5C0-4B41-0F4D-A697-010ABB6B4E67}" type="sibTrans" cxnId="{1170C7CC-FE05-B343-ADEA-FDC51C15F8B7}">
-      <dgm:prSet/>
-      <dgm:spPr/>
-      <dgm:t>
-        <a:bodyPr/>
-        <a:lstStyle/>
-        <a:p>
-          <a:endParaRPr lang="en-US"/>
-        </a:p>
-      </dgm:t>
-    </dgm:pt>
-    <dgm:pt modelId="{4721DCC1-5D03-0346-AC13-1126DA11B14D}">
-      <dgm:prSet/>
-      <dgm:spPr/>
-      <dgm:t>
-        <a:bodyPr/>
-        <a:lstStyle/>
-        <a:p>
-          <a:pPr rtl="0"/>
-          <a:r>
-            <a:rPr lang="en-US" dirty="0" smtClean="0"/>
-            <a:t>Exchanges can interact with multiple message queues</a:t>
-          </a:r>
-          <a:endParaRPr lang="en-US" dirty="0"/>
-        </a:p>
-      </dgm:t>
-    </dgm:pt>
-    <dgm:pt modelId="{EBFB27E4-F1FF-4044-80AF-12B81B124450}" type="parTrans" cxnId="{F65EDAAF-CAE0-F54A-9325-AA295FCCED8B}">
-      <dgm:prSet/>
-      <dgm:spPr/>
-      <dgm:t>
-        <a:bodyPr/>
-        <a:lstStyle/>
-        <a:p>
-          <a:endParaRPr lang="en-US"/>
-        </a:p>
-      </dgm:t>
-    </dgm:pt>
-    <dgm:pt modelId="{8656A76C-CB34-2F4B-B226-D7D5344D04DE}" type="sibTrans" cxnId="{F65EDAAF-CAE0-F54A-9325-AA295FCCED8B}">
-      <dgm:prSet/>
-      <dgm:spPr/>
-      <dgm:t>
-        <a:bodyPr/>
-        <a:lstStyle/>
-        <a:p>
-          <a:endParaRPr lang="en-US"/>
-        </a:p>
-      </dgm:t>
-    </dgm:pt>
     <dgm:pt modelId="{B95E3120-68C6-394F-A61F-C3A7178E10E8}" type="pres">
       <dgm:prSet presAssocID="{2BF771CB-24E5-BE43-9E0C-43C2A194A419}" presName="Name0" presStyleCnt="0">
         <dgm:presLayoutVars>
@@ -2051,51 +1901,12 @@
         </a:p>
       </dgm:t>
     </dgm:pt>
-    <dgm:pt modelId="{54A9211D-933B-6E4C-B54A-64710AD75171}" type="pres">
-      <dgm:prSet presAssocID="{BB4675C8-DDF0-A049-B1CE-8F4BCACA70AF}" presName="linNode" presStyleCnt="0"/>
-      <dgm:spPr/>
-    </dgm:pt>
-    <dgm:pt modelId="{8F6E4F4B-D632-5649-A8D2-D289D0AC04D9}" type="pres">
-      <dgm:prSet presAssocID="{BB4675C8-DDF0-A049-B1CE-8F4BCACA70AF}" presName="parentText" presStyleLbl="node1" presStyleIdx="0" presStyleCnt="3">
-        <dgm:presLayoutVars>
-          <dgm:chMax val="1"/>
-          <dgm:bulletEnabled val="1"/>
-        </dgm:presLayoutVars>
-      </dgm:prSet>
-      <dgm:spPr/>
-      <dgm:t>
-        <a:bodyPr/>
-        <a:lstStyle/>
-        <a:p>
-          <a:endParaRPr lang="en-US"/>
-        </a:p>
-      </dgm:t>
-    </dgm:pt>
-    <dgm:pt modelId="{5D06ADD9-F254-B247-AFFE-357FD0687691}" type="pres">
-      <dgm:prSet presAssocID="{BB4675C8-DDF0-A049-B1CE-8F4BCACA70AF}" presName="descendantText" presStyleLbl="alignAccFollowNode1" presStyleIdx="0" presStyleCnt="3">
-        <dgm:presLayoutVars>
-          <dgm:bulletEnabled val="1"/>
-        </dgm:presLayoutVars>
-      </dgm:prSet>
-      <dgm:spPr/>
-      <dgm:t>
-        <a:bodyPr/>
-        <a:lstStyle/>
-        <a:p>
-          <a:endParaRPr lang="en-US"/>
-        </a:p>
-      </dgm:t>
-    </dgm:pt>
-    <dgm:pt modelId="{CC7F6D14-4FDE-9344-961B-12DCF2A25508}" type="pres">
-      <dgm:prSet presAssocID="{CC2BD989-BA3E-2542-805C-56DCC3DABB7B}" presName="sp" presStyleCnt="0"/>
-      <dgm:spPr/>
-    </dgm:pt>
     <dgm:pt modelId="{9D70D56C-700B-DA41-A09A-20462AFCF392}" type="pres">
       <dgm:prSet presAssocID="{305AC41F-0124-C14F-8E03-BEF9070398DB}" presName="linNode" presStyleCnt="0"/>
       <dgm:spPr/>
     </dgm:pt>
     <dgm:pt modelId="{54DAEC66-97EA-5348-89E5-7A3153220089}" type="pres">
-      <dgm:prSet presAssocID="{305AC41F-0124-C14F-8E03-BEF9070398DB}" presName="parentText" presStyleLbl="node1" presStyleIdx="1" presStyleCnt="3">
+      <dgm:prSet presAssocID="{305AC41F-0124-C14F-8E03-BEF9070398DB}" presName="parentText" presStyleLbl="node1" presStyleIdx="0" presStyleCnt="2">
         <dgm:presLayoutVars>
           <dgm:chMax val="1"/>
           <dgm:bulletEnabled val="1"/>
@@ -2111,7 +1922,7 @@
       </dgm:t>
     </dgm:pt>
     <dgm:pt modelId="{42BC2676-F253-B44A-8751-E5AE3711D8DB}" type="pres">
-      <dgm:prSet presAssocID="{305AC41F-0124-C14F-8E03-BEF9070398DB}" presName="descendantText" presStyleLbl="alignAccFollowNode1" presStyleIdx="1" presStyleCnt="3">
+      <dgm:prSet presAssocID="{305AC41F-0124-C14F-8E03-BEF9070398DB}" presName="descendantText" presStyleLbl="alignAccFollowNode1" presStyleIdx="0" presStyleCnt="2">
         <dgm:presLayoutVars>
           <dgm:bulletEnabled val="1"/>
         </dgm:presLayoutVars>
@@ -2134,7 +1945,7 @@
       <dgm:spPr/>
     </dgm:pt>
     <dgm:pt modelId="{5E1AE8F3-0E5D-1A46-BB03-6BE4B2A2A34E}" type="pres">
-      <dgm:prSet presAssocID="{59DCC0E6-E141-1842-B3F8-F232A5EF15DA}" presName="parentText" presStyleLbl="node1" presStyleIdx="2" presStyleCnt="3">
+      <dgm:prSet presAssocID="{59DCC0E6-E141-1842-B3F8-F232A5EF15DA}" presName="parentText" presStyleLbl="node1" presStyleIdx="1" presStyleCnt="2">
         <dgm:presLayoutVars>
           <dgm:chMax val="1"/>
           <dgm:bulletEnabled val="1"/>
@@ -2150,7 +1961,7 @@
       </dgm:t>
     </dgm:pt>
     <dgm:pt modelId="{C2AFAE46-1472-B240-AC5B-F665A916739D}" type="pres">
-      <dgm:prSet presAssocID="{59DCC0E6-E141-1842-B3F8-F232A5EF15DA}" presName="descendantText" presStyleLbl="alignAccFollowNode1" presStyleIdx="2" presStyleCnt="3">
+      <dgm:prSet presAssocID="{59DCC0E6-E141-1842-B3F8-F232A5EF15DA}" presName="descendantText" presStyleLbl="alignAccFollowNode1" presStyleIdx="1" presStyleCnt="2">
         <dgm:presLayoutVars>
           <dgm:bulletEnabled val="1"/>
         </dgm:presLayoutVars>
@@ -2168,34 +1979,22 @@
   <dgm:cxnLst>
     <dgm:cxn modelId="{099B1638-EB36-9E41-9866-91B3A60FF140}" type="presOf" srcId="{9B48443D-CAE5-3E4C-A457-ED7C16EE1129}" destId="{42BC2676-F253-B44A-8751-E5AE3711D8DB}" srcOrd="0" destOrd="1" presId="urn:microsoft.com/office/officeart/2005/8/layout/vList5"/>
     <dgm:cxn modelId="{AC39DC81-C476-2A47-8EAD-3198CC691DCE}" type="presOf" srcId="{00908E46-6900-004D-AF60-33918592C11E}" destId="{C2AFAE46-1472-B240-AC5B-F665A916739D}" srcOrd="0" destOrd="1" presId="urn:microsoft.com/office/officeart/2005/8/layout/vList5"/>
-    <dgm:cxn modelId="{6C765863-41A3-C84D-BC38-EBD5C857FE24}" srcId="{2BF771CB-24E5-BE43-9E0C-43C2A194A419}" destId="{305AC41F-0124-C14F-8E03-BEF9070398DB}" srcOrd="1" destOrd="0" parTransId="{B04E70A7-1D34-254E-B318-7D96D2E61970}" sibTransId="{8C230903-BB95-0347-879A-D3DE1D7D9BC9}"/>
+    <dgm:cxn modelId="{6C765863-41A3-C84D-BC38-EBD5C857FE24}" srcId="{2BF771CB-24E5-BE43-9E0C-43C2A194A419}" destId="{305AC41F-0124-C14F-8E03-BEF9070398DB}" srcOrd="0" destOrd="0" parTransId="{B04E70A7-1D34-254E-B318-7D96D2E61970}" sibTransId="{8C230903-BB95-0347-879A-D3DE1D7D9BC9}"/>
     <dgm:cxn modelId="{9C08BB85-F3FD-D64C-9EF3-6E567F5DDE78}" srcId="{59DCC0E6-E141-1842-B3F8-F232A5EF15DA}" destId="{00908E46-6900-004D-AF60-33918592C11E}" srcOrd="1" destOrd="0" parTransId="{C7CE75B4-D06E-CB4B-9B88-87CBC2E6F09C}" sibTransId="{C459DF9A-B22C-BE41-BD40-F8CBAEC92CEB}"/>
     <dgm:cxn modelId="{D56899B6-DE43-174D-8084-469BC40BA703}" type="presOf" srcId="{793E7C95-5E68-3C45-BB5F-C2DB0A4097D5}" destId="{C2AFAE46-1472-B240-AC5B-F665A916739D}" srcOrd="0" destOrd="0" presId="urn:microsoft.com/office/officeart/2005/8/layout/vList5"/>
-    <dgm:cxn modelId="{9AD8804A-E2C3-9341-A2C6-AC6E3A3ADD5C}" srcId="{BB4675C8-DDF0-A049-B1CE-8F4BCACA70AF}" destId="{2B967830-8F2C-3D40-B134-EC2E20345CB8}" srcOrd="0" destOrd="0" parTransId="{7745EFFD-6757-A042-90ED-0FD4CAB67D95}" sibTransId="{D2FD852A-4C5B-704B-815F-ED6B12E00609}"/>
     <dgm:cxn modelId="{2AD68B4A-D23B-B741-B3C6-770BCD7AADEA}" type="presOf" srcId="{305AC41F-0124-C14F-8E03-BEF9070398DB}" destId="{54DAEC66-97EA-5348-89E5-7A3153220089}" srcOrd="0" destOrd="0" presId="urn:microsoft.com/office/officeart/2005/8/layout/vList5"/>
     <dgm:cxn modelId="{B538F5B5-9227-994C-8825-401664396F3F}" srcId="{59DCC0E6-E141-1842-B3F8-F232A5EF15DA}" destId="{793E7C95-5E68-3C45-BB5F-C2DB0A4097D5}" srcOrd="0" destOrd="0" parTransId="{430509E1-8DB6-BF41-BC40-372F285777CA}" sibTransId="{B3A2682C-F292-9E47-B735-A63BA2FC7B18}"/>
     <dgm:cxn modelId="{425DE547-4DCD-0B48-B140-0F6598B09C75}" srcId="{305AC41F-0124-C14F-8E03-BEF9070398DB}" destId="{74B0DEB7-5B66-0445-B6D8-CDF95A80269E}" srcOrd="0" destOrd="0" parTransId="{365C1C89-3010-974C-A281-D32EDE5A5337}" sibTransId="{F993F1F7-FD04-344F-8A54-94D960ED65C8}"/>
     <dgm:cxn modelId="{2907FA2D-C22D-7144-9DB7-8874E6573922}" type="presOf" srcId="{59DCC0E6-E141-1842-B3F8-F232A5EF15DA}" destId="{5E1AE8F3-0E5D-1A46-BB03-6BE4B2A2A34E}" srcOrd="0" destOrd="0" presId="urn:microsoft.com/office/officeart/2005/8/layout/vList5"/>
-    <dgm:cxn modelId="{33169C60-3824-2C4A-B3A2-14F663AC693F}" type="presOf" srcId="{F56B1848-931C-5B4A-AB6E-0FAF95AF2142}" destId="{5D06ADD9-F254-B247-AFFE-357FD0687691}" srcOrd="0" destOrd="1" presId="urn:microsoft.com/office/officeart/2005/8/layout/vList5"/>
-    <dgm:cxn modelId="{B16A84A2-BE17-C34D-BD32-300826A4578F}" srcId="{2BF771CB-24E5-BE43-9E0C-43C2A194A419}" destId="{BB4675C8-DDF0-A049-B1CE-8F4BCACA70AF}" srcOrd="0" destOrd="0" parTransId="{610E9004-E1FD-8245-AAB8-792EF7BAEA25}" sibTransId="{CC2BD989-BA3E-2542-805C-56DCC3DABB7B}"/>
     <dgm:cxn modelId="{261E4281-9BFE-B34D-86CA-4F66F75C7E59}" type="presOf" srcId="{74B0DEB7-5B66-0445-B6D8-CDF95A80269E}" destId="{42BC2676-F253-B44A-8751-E5AE3711D8DB}" srcOrd="0" destOrd="0" presId="urn:microsoft.com/office/officeart/2005/8/layout/vList5"/>
     <dgm:cxn modelId="{CF7AA81E-90DD-2C4A-B539-B40B5D894CAA}" type="presOf" srcId="{2BF771CB-24E5-BE43-9E0C-43C2A194A419}" destId="{B95E3120-68C6-394F-A61F-C3A7178E10E8}" srcOrd="0" destOrd="0" presId="urn:microsoft.com/office/officeart/2005/8/layout/vList5"/>
-    <dgm:cxn modelId="{1170C7CC-FE05-B343-ADEA-FDC51C15F8B7}" srcId="{BB4675C8-DDF0-A049-B1CE-8F4BCACA70AF}" destId="{F56B1848-931C-5B4A-AB6E-0FAF95AF2142}" srcOrd="1" destOrd="0" parTransId="{9E31E1BF-4267-2C46-9C69-DE56F0AB17DA}" sibTransId="{BD61E5C0-4B41-0F4D-A697-010ABB6B4E67}"/>
-    <dgm:cxn modelId="{C2D621EB-E5E7-8A42-9DB2-E3089F94911C}" type="presOf" srcId="{4721DCC1-5D03-0346-AC13-1126DA11B14D}" destId="{5D06ADD9-F254-B247-AFFE-357FD0687691}" srcOrd="0" destOrd="2" presId="urn:microsoft.com/office/officeart/2005/8/layout/vList5"/>
     <dgm:cxn modelId="{7162834E-955F-8F4F-8173-280D37B51ED0}" srcId="{305AC41F-0124-C14F-8E03-BEF9070398DB}" destId="{9B48443D-CAE5-3E4C-A457-ED7C16EE1129}" srcOrd="1" destOrd="0" parTransId="{E42B442C-6B3F-EF43-B905-82ACFCBA775A}" sibTransId="{5E43B246-6653-204B-AD41-CCB484E053F6}"/>
-    <dgm:cxn modelId="{5FAC1772-EEAE-4147-BA80-6DA91B41F33B}" type="presOf" srcId="{BB4675C8-DDF0-A049-B1CE-8F4BCACA70AF}" destId="{8F6E4F4B-D632-5649-A8D2-D289D0AC04D9}" srcOrd="0" destOrd="0" presId="urn:microsoft.com/office/officeart/2005/8/layout/vList5"/>
-    <dgm:cxn modelId="{F65EDAAF-CAE0-F54A-9325-AA295FCCED8B}" srcId="{BB4675C8-DDF0-A049-B1CE-8F4BCACA70AF}" destId="{4721DCC1-5D03-0346-AC13-1126DA11B14D}" srcOrd="2" destOrd="0" parTransId="{EBFB27E4-F1FF-4044-80AF-12B81B124450}" sibTransId="{8656A76C-CB34-2F4B-B226-D7D5344D04DE}"/>
-    <dgm:cxn modelId="{4188B1F1-EA1B-DC45-9CF0-2969E43213D2}" type="presOf" srcId="{2B967830-8F2C-3D40-B134-EC2E20345CB8}" destId="{5D06ADD9-F254-B247-AFFE-357FD0687691}" srcOrd="0" destOrd="0" presId="urn:microsoft.com/office/officeart/2005/8/layout/vList5"/>
-    <dgm:cxn modelId="{2BC83A84-2684-6E45-B43E-C295340142D8}" srcId="{2BF771CB-24E5-BE43-9E0C-43C2A194A419}" destId="{59DCC0E6-E141-1842-B3F8-F232A5EF15DA}" srcOrd="2" destOrd="0" parTransId="{82F337A2-8A21-7741-9236-9F9BA161F138}" sibTransId="{06676F3D-C8E1-7840-B609-B0D6811311C0}"/>
-    <dgm:cxn modelId="{9C8D0863-5BCB-E649-BC49-E8674124B857}" type="presParOf" srcId="{B95E3120-68C6-394F-A61F-C3A7178E10E8}" destId="{54A9211D-933B-6E4C-B54A-64710AD75171}" srcOrd="0" destOrd="0" presId="urn:microsoft.com/office/officeart/2005/8/layout/vList5"/>
-    <dgm:cxn modelId="{C42EFB6A-0394-8949-88FD-677637251556}" type="presParOf" srcId="{54A9211D-933B-6E4C-B54A-64710AD75171}" destId="{8F6E4F4B-D632-5649-A8D2-D289D0AC04D9}" srcOrd="0" destOrd="0" presId="urn:microsoft.com/office/officeart/2005/8/layout/vList5"/>
-    <dgm:cxn modelId="{204EE7C8-1ADA-D74A-86E6-F71A7E8C14D2}" type="presParOf" srcId="{54A9211D-933B-6E4C-B54A-64710AD75171}" destId="{5D06ADD9-F254-B247-AFFE-357FD0687691}" srcOrd="1" destOrd="0" presId="urn:microsoft.com/office/officeart/2005/8/layout/vList5"/>
-    <dgm:cxn modelId="{CB5AA7DC-BA53-CD40-B6E3-BE74D50A0172}" type="presParOf" srcId="{B95E3120-68C6-394F-A61F-C3A7178E10E8}" destId="{CC7F6D14-4FDE-9344-961B-12DCF2A25508}" srcOrd="1" destOrd="0" presId="urn:microsoft.com/office/officeart/2005/8/layout/vList5"/>
-    <dgm:cxn modelId="{F08D0A74-3E16-124E-B019-7ECEF7CA7A7A}" type="presParOf" srcId="{B95E3120-68C6-394F-A61F-C3A7178E10E8}" destId="{9D70D56C-700B-DA41-A09A-20462AFCF392}" srcOrd="2" destOrd="0" presId="urn:microsoft.com/office/officeart/2005/8/layout/vList5"/>
+    <dgm:cxn modelId="{2BC83A84-2684-6E45-B43E-C295340142D8}" srcId="{2BF771CB-24E5-BE43-9E0C-43C2A194A419}" destId="{59DCC0E6-E141-1842-B3F8-F232A5EF15DA}" srcOrd="1" destOrd="0" parTransId="{82F337A2-8A21-7741-9236-9F9BA161F138}" sibTransId="{06676F3D-C8E1-7840-B609-B0D6811311C0}"/>
+    <dgm:cxn modelId="{F08D0A74-3E16-124E-B019-7ECEF7CA7A7A}" type="presParOf" srcId="{B95E3120-68C6-394F-A61F-C3A7178E10E8}" destId="{9D70D56C-700B-DA41-A09A-20462AFCF392}" srcOrd="0" destOrd="0" presId="urn:microsoft.com/office/officeart/2005/8/layout/vList5"/>
     <dgm:cxn modelId="{E004AE7C-47F6-224A-AB14-5532662B51D4}" type="presParOf" srcId="{9D70D56C-700B-DA41-A09A-20462AFCF392}" destId="{54DAEC66-97EA-5348-89E5-7A3153220089}" srcOrd="0" destOrd="0" presId="urn:microsoft.com/office/officeart/2005/8/layout/vList5"/>
     <dgm:cxn modelId="{8E0F149C-0AB4-DB4E-94BC-22E89D735C23}" type="presParOf" srcId="{9D70D56C-700B-DA41-A09A-20462AFCF392}" destId="{42BC2676-F253-B44A-8751-E5AE3711D8DB}" srcOrd="1" destOrd="0" presId="urn:microsoft.com/office/officeart/2005/8/layout/vList5"/>
-    <dgm:cxn modelId="{36900B1F-9496-2E43-80F7-A009774EC87D}" type="presParOf" srcId="{B95E3120-68C6-394F-A61F-C3A7178E10E8}" destId="{319B8A97-40D1-6649-AA12-445EA6287992}" srcOrd="3" destOrd="0" presId="urn:microsoft.com/office/officeart/2005/8/layout/vList5"/>
-    <dgm:cxn modelId="{AEB062FB-51C4-6947-BBA1-7A87AE245F51}" type="presParOf" srcId="{B95E3120-68C6-394F-A61F-C3A7178E10E8}" destId="{26F0DDDA-B98C-0E48-A6DD-3EF4D9DC2605}" srcOrd="4" destOrd="0" presId="urn:microsoft.com/office/officeart/2005/8/layout/vList5"/>
+    <dgm:cxn modelId="{36900B1F-9496-2E43-80F7-A009774EC87D}" type="presParOf" srcId="{B95E3120-68C6-394F-A61F-C3A7178E10E8}" destId="{319B8A97-40D1-6649-AA12-445EA6287992}" srcOrd="1" destOrd="0" presId="urn:microsoft.com/office/officeart/2005/8/layout/vList5"/>
+    <dgm:cxn modelId="{AEB062FB-51C4-6947-BBA1-7A87AE245F51}" type="presParOf" srcId="{B95E3120-68C6-394F-A61F-C3A7178E10E8}" destId="{26F0DDDA-B98C-0E48-A6DD-3EF4D9DC2605}" srcOrd="2" destOrd="0" presId="urn:microsoft.com/office/officeart/2005/8/layout/vList5"/>
     <dgm:cxn modelId="{67251136-A6F2-E94F-BE4E-012EE1B1B0EF}" type="presParOf" srcId="{26F0DDDA-B98C-0E48-A6DD-3EF4D9DC2605}" destId="{5E1AE8F3-0E5D-1A46-BB03-6BE4B2A2A34E}" srcOrd="0" destOrd="0" presId="urn:microsoft.com/office/officeart/2005/8/layout/vList5"/>
     <dgm:cxn modelId="{9DAA3B29-F493-3D46-8F17-985F3BD439AC}" type="presParOf" srcId="{26F0DDDA-B98C-0E48-A6DD-3EF4D9DC2605}" destId="{C2AFAE46-1472-B240-AC5B-F665A916739D}" srcOrd="1" destOrd="0" presId="urn:microsoft.com/office/officeart/2005/8/layout/vList5"/>
   </dgm:cxnLst>
@@ -2602,15 +2401,15 @@
       <dsp:cNvGrpSpPr/>
     </dsp:nvGrpSpPr>
     <dsp:grpSpPr/>
-    <dsp:sp modelId="{5D06ADD9-F254-B247-AFFE-357FD0687691}">
+    <dsp:sp modelId="{42BC2676-F253-B44A-8751-E5AE3711D8DB}">
       <dsp:nvSpPr>
         <dsp:cNvPr id="0" name=""/>
         <dsp:cNvSpPr/>
       </dsp:nvSpPr>
       <dsp:spPr>
         <a:xfrm rot="5400000">
-          <a:off x="6589693" y="-2661723"/>
-          <a:ext cx="1121829" cy="6729984"/>
+          <a:off x="6301587" y="-2303662"/>
+          <a:ext cx="1698041" cy="6729984"/>
         </a:xfrm>
         <a:prstGeom prst="round2SameRect">
           <a:avLst/>
@@ -2654,12 +2453,12 @@
         <a:fontRef idx="minor"/>
       </dsp:style>
       <dsp:txBody>
-        <a:bodyPr spcFirstLastPara="0" vert="horz" wrap="square" lIns="64770" tIns="32385" rIns="64770" bIns="32385" numCol="1" spcCol="1270" anchor="ctr" anchorCtr="0">
+        <a:bodyPr spcFirstLastPara="0" vert="horz" wrap="square" lIns="91440" tIns="45720" rIns="91440" bIns="45720" numCol="1" spcCol="1270" anchor="ctr" anchorCtr="0">
           <a:noAutofit/>
         </a:bodyPr>
         <a:lstStyle/>
         <a:p>
-          <a:pPr marL="171450" lvl="1" indent="-171450" algn="l" defTabSz="755650" rtl="0">
+          <a:pPr marL="228600" lvl="1" indent="-228600" algn="l" defTabSz="1066800" rtl="0">
             <a:lnSpc>
               <a:spcPct val="90000"/>
             </a:lnSpc>
@@ -2672,13 +2471,13 @@
             <a:buChar char="•"/>
           </a:pPr>
           <a:r>
-            <a:rPr lang="en-US" sz="1700" kern="1200" dirty="0" smtClean="0"/>
-            <a:t>Exchange</a:t>
+            <a:rPr lang="en-US" sz="2400" kern="1200" smtClean="0"/>
+            <a:t>Accepts producer messages </a:t>
           </a:r>
-          <a:endParaRPr lang="en-US" sz="1700" kern="1200" dirty="0"/>
+          <a:endParaRPr lang="en-US" sz="2400" kern="1200"/>
         </a:p>
         <a:p>
-          <a:pPr marL="171450" lvl="1" indent="-171450" algn="l" defTabSz="755650" rtl="0">
+          <a:pPr marL="228600" lvl="1" indent="-228600" algn="l" defTabSz="1066800" rtl="0">
             <a:lnSpc>
               <a:spcPct val="90000"/>
             </a:lnSpc>
@@ -2691,45 +2490,26 @@
             <a:buChar char="•"/>
           </a:pPr>
           <a:r>
-            <a:rPr lang="en-US" sz="1700" kern="1200" dirty="0" smtClean="0"/>
-            <a:t>Message Queue</a:t>
+            <a:rPr lang="en-US" sz="2400" kern="1200" dirty="0" smtClean="0"/>
+            <a:t>Sends to 0 or more Message Queues using routing keys</a:t>
           </a:r>
-          <a:endParaRPr lang="en-US" sz="1700" kern="1200" dirty="0"/>
-        </a:p>
-        <a:p>
-          <a:pPr marL="171450" lvl="1" indent="-171450" algn="l" defTabSz="755650" rtl="0">
-            <a:lnSpc>
-              <a:spcPct val="90000"/>
-            </a:lnSpc>
-            <a:spcBef>
-              <a:spcPct val="0"/>
-            </a:spcBef>
-            <a:spcAft>
-              <a:spcPct val="15000"/>
-            </a:spcAft>
-            <a:buChar char="•"/>
-          </a:pPr>
-          <a:r>
-            <a:rPr lang="en-US" sz="1700" kern="1200" dirty="0" smtClean="0"/>
-            <a:t>Exchanges can interact with multiple message queues</a:t>
-          </a:r>
-          <a:endParaRPr lang="en-US" sz="1700" kern="1200" dirty="0"/>
+          <a:endParaRPr lang="en-US" sz="2400" kern="1200" dirty="0"/>
         </a:p>
       </dsp:txBody>
       <dsp:txXfrm rot="-5400000">
-        <a:off x="3785616" y="197117"/>
-        <a:ext cx="6675221" cy="1012303"/>
+        <a:off x="3785616" y="295201"/>
+        <a:ext cx="6647092" cy="1532257"/>
       </dsp:txXfrm>
     </dsp:sp>
-    <dsp:sp modelId="{8F6E4F4B-D632-5649-A8D2-D289D0AC04D9}">
+    <dsp:sp modelId="{54DAEC66-97EA-5348-89E5-7A3153220089}">
       <dsp:nvSpPr>
         <dsp:cNvPr id="0" name=""/>
         <dsp:cNvSpPr/>
       </dsp:nvSpPr>
       <dsp:spPr>
         <a:xfrm>
-          <a:off x="0" y="2124"/>
-          <a:ext cx="3785616" cy="1402286"/>
+          <a:off x="0" y="53"/>
+          <a:ext cx="3785616" cy="2122552"/>
         </a:xfrm>
         <a:prstGeom prst="roundRect">
           <a:avLst/>
@@ -2792,12 +2572,12 @@
         </a:fontRef>
       </dsp:style>
       <dsp:txBody>
-        <a:bodyPr spcFirstLastPara="0" vert="horz" wrap="square" lIns="152400" tIns="76200" rIns="152400" bIns="76200" numCol="1" spcCol="1270" anchor="ctr" anchorCtr="0">
+        <a:bodyPr spcFirstLastPara="0" vert="horz" wrap="square" lIns="228600" tIns="114300" rIns="228600" bIns="114300" numCol="1" spcCol="1270" anchor="ctr" anchorCtr="0">
           <a:noAutofit/>
         </a:bodyPr>
         <a:lstStyle/>
         <a:p>
-          <a:pPr lvl="0" algn="ctr" defTabSz="1778000" rtl="0">
+          <a:pPr lvl="0" algn="ctr" defTabSz="2667000" rtl="0">
             <a:lnSpc>
               <a:spcPct val="90000"/>
             </a:lnSpc>
@@ -2809,25 +2589,26 @@
             </a:spcAft>
           </a:pPr>
           <a:r>
-            <a:rPr lang="en-US" sz="4000" kern="1200" dirty="0" smtClean="0"/>
-            <a:t>Two main parts</a:t>
+            <a:rPr lang="en-US" sz="6000" kern="1200" smtClean="0"/>
+            <a:t>Exchange</a:t>
           </a:r>
+          <a:endParaRPr lang="en-US" sz="6000" kern="1200"/>
         </a:p>
       </dsp:txBody>
       <dsp:txXfrm>
-        <a:off x="68454" y="70578"/>
-        <a:ext cx="3648708" cy="1265378"/>
+        <a:off x="103614" y="103667"/>
+        <a:ext cx="3578388" cy="1915324"/>
       </dsp:txXfrm>
     </dsp:sp>
-    <dsp:sp modelId="{42BC2676-F253-B44A-8751-E5AE3711D8DB}">
+    <dsp:sp modelId="{C2AFAE46-1472-B240-AC5B-F665A916739D}">
       <dsp:nvSpPr>
         <dsp:cNvPr id="0" name=""/>
         <dsp:cNvSpPr/>
       </dsp:nvSpPr>
       <dsp:spPr>
         <a:xfrm rot="5400000">
-          <a:off x="6589693" y="-1189323"/>
-          <a:ext cx="1121829" cy="6729984"/>
+          <a:off x="6301587" y="-74983"/>
+          <a:ext cx="1698041" cy="6729984"/>
         </a:xfrm>
         <a:prstGeom prst="round2SameRect">
           <a:avLst/>
@@ -2871,12 +2652,12 @@
         <a:fontRef idx="minor"/>
       </dsp:style>
       <dsp:txBody>
-        <a:bodyPr spcFirstLastPara="0" vert="horz" wrap="square" lIns="64770" tIns="32385" rIns="64770" bIns="32385" numCol="1" spcCol="1270" anchor="ctr" anchorCtr="0">
+        <a:bodyPr spcFirstLastPara="0" vert="horz" wrap="square" lIns="91440" tIns="45720" rIns="91440" bIns="45720" numCol="1" spcCol="1270" anchor="ctr" anchorCtr="0">
           <a:noAutofit/>
         </a:bodyPr>
         <a:lstStyle/>
         <a:p>
-          <a:pPr marL="171450" lvl="1" indent="-171450" algn="l" defTabSz="755650" rtl="0">
+          <a:pPr marL="228600" lvl="1" indent="-228600" algn="l" defTabSz="1066800" rtl="0">
             <a:lnSpc>
               <a:spcPct val="90000"/>
             </a:lnSpc>
@@ -2889,13 +2670,13 @@
             <a:buChar char="•"/>
           </a:pPr>
           <a:r>
-            <a:rPr lang="en-US" sz="1700" kern="1200" smtClean="0"/>
-            <a:t>Accepts producer messages </a:t>
+            <a:rPr lang="en-US" sz="2400" kern="1200" dirty="0" smtClean="0"/>
+            <a:t>Routes messages to different consumers depending on arbitrary criteria</a:t>
           </a:r>
-          <a:endParaRPr lang="en-US" sz="1700" kern="1200"/>
+          <a:endParaRPr lang="en-US" sz="2400" kern="1200" dirty="0"/>
         </a:p>
         <a:p>
-          <a:pPr marL="171450" lvl="1" indent="-171450" algn="l" defTabSz="755650" rtl="0">
+          <a:pPr marL="228600" lvl="1" indent="-228600" algn="l" defTabSz="1066800" rtl="0">
             <a:lnSpc>
               <a:spcPct val="90000"/>
             </a:lnSpc>
@@ -2908,26 +2689,26 @@
             <a:buChar char="•"/>
           </a:pPr>
           <a:r>
-            <a:rPr lang="en-US" sz="1700" kern="1200" dirty="0" smtClean="0"/>
-            <a:t>Sends to 0 or more Message Queues using routing keys</a:t>
+            <a:rPr lang="en-US" sz="2400" kern="1200" dirty="0" smtClean="0"/>
+            <a:t>Buffers messages when consumers are not able to accept them fast enough. </a:t>
           </a:r>
-          <a:endParaRPr lang="en-US" sz="1700" kern="1200" dirty="0"/>
+          <a:endParaRPr lang="en-US" sz="2400" kern="1200" dirty="0"/>
         </a:p>
       </dsp:txBody>
       <dsp:txXfrm rot="-5400000">
-        <a:off x="3785616" y="1669517"/>
-        <a:ext cx="6675221" cy="1012303"/>
+        <a:off x="3785616" y="2523880"/>
+        <a:ext cx="6647092" cy="1532257"/>
       </dsp:txXfrm>
     </dsp:sp>
-    <dsp:sp modelId="{54DAEC66-97EA-5348-89E5-7A3153220089}">
+    <dsp:sp modelId="{5E1AE8F3-0E5D-1A46-BB03-6BE4B2A2A34E}">
       <dsp:nvSpPr>
         <dsp:cNvPr id="0" name=""/>
         <dsp:cNvSpPr/>
       </dsp:nvSpPr>
       <dsp:spPr>
         <a:xfrm>
-          <a:off x="0" y="1474525"/>
-          <a:ext cx="3785616" cy="1402286"/>
+          <a:off x="0" y="2228732"/>
+          <a:ext cx="3785616" cy="2122552"/>
         </a:xfrm>
         <a:prstGeom prst="roundRect">
           <a:avLst/>
@@ -2990,12 +2771,12 @@
         </a:fontRef>
       </dsp:style>
       <dsp:txBody>
-        <a:bodyPr spcFirstLastPara="0" vert="horz" wrap="square" lIns="152400" tIns="76200" rIns="152400" bIns="76200" numCol="1" spcCol="1270" anchor="ctr" anchorCtr="0">
+        <a:bodyPr spcFirstLastPara="0" vert="horz" wrap="square" lIns="228600" tIns="114300" rIns="228600" bIns="114300" numCol="1" spcCol="1270" anchor="ctr" anchorCtr="0">
           <a:noAutofit/>
         </a:bodyPr>
         <a:lstStyle/>
         <a:p>
-          <a:pPr lvl="0" algn="ctr" defTabSz="1778000" rtl="0">
+          <a:pPr lvl="0" algn="ctr" defTabSz="2667000" rtl="0">
             <a:lnSpc>
               <a:spcPct val="90000"/>
             </a:lnSpc>
@@ -3007,214 +2788,15 @@
             </a:spcAft>
           </a:pPr>
           <a:r>
-            <a:rPr lang="en-US" sz="4000" kern="1200" smtClean="0"/>
-            <a:t>Exchange</a:t>
+            <a:rPr lang="en-US" sz="6000" kern="1200" smtClean="0"/>
+            <a:t>Message Queue</a:t>
           </a:r>
-          <a:endParaRPr lang="en-US" sz="4000" kern="1200"/>
+          <a:endParaRPr lang="en-US" sz="6000" kern="1200"/>
         </a:p>
       </dsp:txBody>
       <dsp:txXfrm>
-        <a:off x="68454" y="1542979"/>
-        <a:ext cx="3648708" cy="1265378"/>
-      </dsp:txXfrm>
-    </dsp:sp>
-    <dsp:sp modelId="{C2AFAE46-1472-B240-AC5B-F665A916739D}">
-      <dsp:nvSpPr>
-        <dsp:cNvPr id="0" name=""/>
-        <dsp:cNvSpPr/>
-      </dsp:nvSpPr>
-      <dsp:spPr>
-        <a:xfrm rot="5400000">
-          <a:off x="6589693" y="283077"/>
-          <a:ext cx="1121829" cy="6729984"/>
-        </a:xfrm>
-        <a:prstGeom prst="round2SameRect">
-          <a:avLst/>
-        </a:prstGeom>
-        <a:solidFill>
-          <a:schemeClr val="accent1">
-            <a:alpha val="90000"/>
-            <a:tint val="40000"/>
-            <a:hueOff val="0"/>
-            <a:satOff val="0"/>
-            <a:lumOff val="0"/>
-            <a:alphaOff val="0"/>
-          </a:schemeClr>
-        </a:solidFill>
-        <a:ln w="6350" cap="flat" cmpd="sng" algn="ctr">
-          <a:solidFill>
-            <a:schemeClr val="accent1">
-              <a:alpha val="90000"/>
-              <a:tint val="40000"/>
-              <a:hueOff val="0"/>
-              <a:satOff val="0"/>
-              <a:lumOff val="0"/>
-              <a:alphaOff val="0"/>
-            </a:schemeClr>
-          </a:solidFill>
-          <a:prstDash val="solid"/>
-          <a:miter lim="800000"/>
-        </a:ln>
-        <a:effectLst/>
-      </dsp:spPr>
-      <dsp:style>
-        <a:lnRef idx="1">
-          <a:scrgbClr r="0" g="0" b="0"/>
-        </a:lnRef>
-        <a:fillRef idx="1">
-          <a:scrgbClr r="0" g="0" b="0"/>
-        </a:fillRef>
-        <a:effectRef idx="0">
-          <a:scrgbClr r="0" g="0" b="0"/>
-        </a:effectRef>
-        <a:fontRef idx="minor"/>
-      </dsp:style>
-      <dsp:txBody>
-        <a:bodyPr spcFirstLastPara="0" vert="horz" wrap="square" lIns="64770" tIns="32385" rIns="64770" bIns="32385" numCol="1" spcCol="1270" anchor="ctr" anchorCtr="0">
-          <a:noAutofit/>
-        </a:bodyPr>
-        <a:lstStyle/>
-        <a:p>
-          <a:pPr marL="171450" lvl="1" indent="-171450" algn="l" defTabSz="755650" rtl="0">
-            <a:lnSpc>
-              <a:spcPct val="90000"/>
-            </a:lnSpc>
-            <a:spcBef>
-              <a:spcPct val="0"/>
-            </a:spcBef>
-            <a:spcAft>
-              <a:spcPct val="15000"/>
-            </a:spcAft>
-            <a:buChar char="•"/>
-          </a:pPr>
-          <a:r>
-            <a:rPr lang="en-US" sz="1700" kern="1200" dirty="0" smtClean="0"/>
-            <a:t>Routes messages to different consumers depending on arbitrary criteria</a:t>
-          </a:r>
-          <a:endParaRPr lang="en-US" sz="1700" kern="1200" dirty="0"/>
-        </a:p>
-        <a:p>
-          <a:pPr marL="171450" lvl="1" indent="-171450" algn="l" defTabSz="755650" rtl="0">
-            <a:lnSpc>
-              <a:spcPct val="90000"/>
-            </a:lnSpc>
-            <a:spcBef>
-              <a:spcPct val="0"/>
-            </a:spcBef>
-            <a:spcAft>
-              <a:spcPct val="15000"/>
-            </a:spcAft>
-            <a:buChar char="•"/>
-          </a:pPr>
-          <a:r>
-            <a:rPr lang="en-US" sz="1700" kern="1200" dirty="0" smtClean="0"/>
-            <a:t>Buffers messages when consumers are not able to accept them fast enough. </a:t>
-          </a:r>
-          <a:endParaRPr lang="en-US" sz="1700" kern="1200" dirty="0"/>
-        </a:p>
-      </dsp:txBody>
-      <dsp:txXfrm rot="-5400000">
-        <a:off x="3785616" y="3141918"/>
-        <a:ext cx="6675221" cy="1012303"/>
-      </dsp:txXfrm>
-    </dsp:sp>
-    <dsp:sp modelId="{5E1AE8F3-0E5D-1A46-BB03-6BE4B2A2A34E}">
-      <dsp:nvSpPr>
-        <dsp:cNvPr id="0" name=""/>
-        <dsp:cNvSpPr/>
-      </dsp:nvSpPr>
-      <dsp:spPr>
-        <a:xfrm>
-          <a:off x="0" y="2946926"/>
-          <a:ext cx="3785616" cy="1402286"/>
-        </a:xfrm>
-        <a:prstGeom prst="roundRect">
-          <a:avLst/>
-        </a:prstGeom>
-        <a:gradFill rotWithShape="0">
-          <a:gsLst>
-            <a:gs pos="0">
-              <a:schemeClr val="accent1">
-                <a:hueOff val="0"/>
-                <a:satOff val="0"/>
-                <a:lumOff val="0"/>
-                <a:alphaOff val="0"/>
-                <a:satMod val="103000"/>
-                <a:lumMod val="102000"/>
-                <a:tint val="94000"/>
-              </a:schemeClr>
-            </a:gs>
-            <a:gs pos="50000">
-              <a:schemeClr val="accent1">
-                <a:hueOff val="0"/>
-                <a:satOff val="0"/>
-                <a:lumOff val="0"/>
-                <a:alphaOff val="0"/>
-                <a:satMod val="110000"/>
-                <a:lumMod val="100000"/>
-                <a:shade val="100000"/>
-              </a:schemeClr>
-            </a:gs>
-            <a:gs pos="100000">
-              <a:schemeClr val="accent1">
-                <a:hueOff val="0"/>
-                <a:satOff val="0"/>
-                <a:lumOff val="0"/>
-                <a:alphaOff val="0"/>
-                <a:lumMod val="99000"/>
-                <a:satMod val="120000"/>
-                <a:shade val="78000"/>
-              </a:schemeClr>
-            </a:gs>
-          </a:gsLst>
-          <a:lin ang="5400000" scaled="0"/>
-        </a:gradFill>
-        <a:ln>
-          <a:noFill/>
-        </a:ln>
-        <a:effectLst/>
-      </dsp:spPr>
-      <dsp:style>
-        <a:lnRef idx="0">
-          <a:scrgbClr r="0" g="0" b="0"/>
-        </a:lnRef>
-        <a:fillRef idx="3">
-          <a:scrgbClr r="0" g="0" b="0"/>
-        </a:fillRef>
-        <a:effectRef idx="2">
-          <a:scrgbClr r="0" g="0" b="0"/>
-        </a:effectRef>
-        <a:fontRef idx="minor">
-          <a:schemeClr val="lt1"/>
-        </a:fontRef>
-      </dsp:style>
-      <dsp:txBody>
-        <a:bodyPr spcFirstLastPara="0" vert="horz" wrap="square" lIns="152400" tIns="76200" rIns="152400" bIns="76200" numCol="1" spcCol="1270" anchor="ctr" anchorCtr="0">
-          <a:noAutofit/>
-        </a:bodyPr>
-        <a:lstStyle/>
-        <a:p>
-          <a:pPr lvl="0" algn="ctr" defTabSz="1778000" rtl="0">
-            <a:lnSpc>
-              <a:spcPct val="90000"/>
-            </a:lnSpc>
-            <a:spcBef>
-              <a:spcPct val="0"/>
-            </a:spcBef>
-            <a:spcAft>
-              <a:spcPct val="35000"/>
-            </a:spcAft>
-          </a:pPr>
-          <a:r>
-            <a:rPr lang="en-US" sz="4000" kern="1200" smtClean="0"/>
-            <a:t>Message Queue</a:t>
-          </a:r>
-          <a:endParaRPr lang="en-US" sz="4000" kern="1200"/>
-        </a:p>
-      </dsp:txBody>
-      <dsp:txXfrm>
-        <a:off x="68454" y="3015380"/>
-        <a:ext cx="3648708" cy="1265378"/>
+        <a:off x="103614" y="2332346"/>
+        <a:ext cx="3578388" cy="1915324"/>
       </dsp:txXfrm>
     </dsp:sp>
   </dsp:spTree>
@@ -9566,7 +9148,7 @@
       </p:grpSpPr>
       <p:sp>
         <p:nvSpPr>
-          <p:cNvPr id="2" name="Title 1"/>
+          <p:cNvPr id="3" name="Title 2"/>
           <p:cNvSpPr>
             <a:spLocks noGrp="1"/>
           </p:cNvSpPr>
@@ -9581,112 +9163,41 @@
           <a:p>
             <a:r>
               <a:rPr lang="en-US" dirty="0" smtClean="0"/>
-              <a:t>Producers and Consumers</a:t>
+              <a:t>An AMQP Server (or Broker)</a:t>
             </a:r>
             <a:endParaRPr lang="en-US" dirty="0"/>
           </a:p>
         </p:txBody>
       </p:sp>
-      <p:sp>
-        <p:nvSpPr>
-          <p:cNvPr id="3" name="Content Placeholder 2"/>
-          <p:cNvSpPr>
-            <a:spLocks noGrp="1"/>
-          </p:cNvSpPr>
+      <p:graphicFrame>
+        <p:nvGraphicFramePr>
+          <p:cNvPr id="2" name="Content Placeholder 1"/>
+          <p:cNvGraphicFramePr>
+            <a:graphicFrameLocks noGrp="1"/>
+          </p:cNvGraphicFramePr>
           <p:nvPr>
             <p:ph idx="1"/>
+            <p:extLst>
+              <p:ext uri="{D42A27DB-BD31-4B8C-83A1-F6EECF244321}">
+                <p14:modId xmlns:p14="http://schemas.microsoft.com/office/powerpoint/2010/main" val="277350009"/>
+              </p:ext>
+            </p:extLst>
           </p:nvPr>
-        </p:nvSpPr>
-        <p:spPr>
-          <a:xfrm>
-            <a:off x="838200" y="1694993"/>
-            <a:ext cx="10515600" cy="4817018"/>
-          </a:xfrm>
-        </p:spPr>
-        <p:style>
-          <a:lnRef idx="2">
-            <a:schemeClr val="accent2">
-              <a:shade val="50000"/>
-            </a:schemeClr>
-          </a:lnRef>
-          <a:fillRef idx="1">
-            <a:schemeClr val="accent2"/>
-          </a:fillRef>
-          <a:effectRef idx="0">
-            <a:schemeClr val="accent2"/>
-          </a:effectRef>
-          <a:fontRef idx="minor">
-            <a:schemeClr val="lt1"/>
-          </a:fontRef>
-        </p:style>
-        <p:txBody>
-          <a:bodyPr/>
-          <a:lstStyle/>
-          <a:p>
-            <a:r>
-              <a:rPr lang="en-US" dirty="0" smtClean="0"/>
-              <a:t>Producers only interact with Exchanges</a:t>
-            </a:r>
-          </a:p>
-          <a:p>
-            <a:r>
-              <a:rPr lang="en-US" dirty="0" smtClean="0"/>
-              <a:t>Consumers interact with Message Queues</a:t>
-            </a:r>
-          </a:p>
-          <a:p>
-            <a:r>
-              <a:rPr lang="en-US" dirty="0" smtClean="0"/>
-              <a:t>Consumers aren’t passive</a:t>
-            </a:r>
-          </a:p>
-          <a:p>
-            <a:pPr lvl="1"/>
-            <a:r>
-              <a:rPr lang="en-US" dirty="0" smtClean="0"/>
-              <a:t>Can create and destroy message queues</a:t>
-            </a:r>
-          </a:p>
-          <a:p>
-            <a:r>
-              <a:rPr lang="en-US" dirty="0" smtClean="0"/>
-              <a:t>The same application can act as both a publisher and a consumer</a:t>
-            </a:r>
-          </a:p>
-          <a:p>
-            <a:pPr lvl="1"/>
-            <a:r>
-              <a:rPr lang="en-US" dirty="0" smtClean="0"/>
-              <a:t>You can implement Request-Response with AMQP</a:t>
-            </a:r>
-          </a:p>
-          <a:p>
-            <a:pPr lvl="1"/>
-            <a:r>
-              <a:rPr lang="en-US" dirty="0" smtClean="0"/>
-              <a:t>Except the publisher doesn’t block</a:t>
-            </a:r>
-            <a:endParaRPr lang="en-US" dirty="0"/>
-          </a:p>
-          <a:p>
-            <a:r>
-              <a:rPr lang="en-US" dirty="0" smtClean="0"/>
-              <a:t>Ex: your application may want an ACK or NACK when it publishes</a:t>
-            </a:r>
-          </a:p>
-          <a:p>
-            <a:pPr lvl="1"/>
-            <a:r>
-              <a:rPr lang="en-US" dirty="0" smtClean="0"/>
-              <a:t>This is a reply queue</a:t>
-            </a:r>
-          </a:p>
-        </p:txBody>
-      </p:sp>
+        </p:nvGraphicFramePr>
+        <p:xfrm>
+          <a:off x="838200" y="1825625"/>
+          <a:ext cx="10515600" cy="4351338"/>
+        </p:xfrm>
+        <a:graphic>
+          <a:graphicData uri="http://schemas.openxmlformats.org/drawingml/2006/diagram">
+            <dgm:relIds xmlns:dgm="http://schemas.openxmlformats.org/drawingml/2006/diagram" xmlns:r="http://schemas.openxmlformats.org/officeDocument/2006/relationships" r:dm="rId2" r:lo="rId3" r:qs="rId4" r:cs="rId5"/>
+          </a:graphicData>
+        </a:graphic>
+      </p:graphicFrame>
     </p:spTree>
     <p:extLst>
       <p:ext uri="{BB962C8B-B14F-4D97-AF65-F5344CB8AC3E}">
-        <p14:creationId xmlns:p14="http://schemas.microsoft.com/office/powerpoint/2010/main" val="394498896"/>
+        <p14:creationId xmlns:p14="http://schemas.microsoft.com/office/powerpoint/2010/main" val="557114488"/>
       </p:ext>
     </p:extLst>
   </p:cSld>
@@ -9737,7 +9248,7 @@
           <a:p>
             <a:r>
               <a:rPr lang="en-US" dirty="0" smtClean="0"/>
-              <a:t>Message Queue Properties and Examples</a:t>
+              <a:t>Producers and Consumers</a:t>
             </a:r>
             <a:endParaRPr lang="en-US" dirty="0"/>
           </a:p>
@@ -9755,211 +9266,94 @@
         </p:nvSpPr>
         <p:spPr>
           <a:xfrm>
-            <a:off x="838200" y="1694992"/>
-            <a:ext cx="10515600" cy="4940585"/>
+            <a:off x="838200" y="1694993"/>
+            <a:ext cx="10515600" cy="4817018"/>
           </a:xfrm>
         </p:spPr>
         <p:style>
           <a:lnRef idx="2">
-            <a:schemeClr val="accent6">
+            <a:schemeClr val="accent2">
               <a:shade val="50000"/>
             </a:schemeClr>
           </a:lnRef>
           <a:fillRef idx="1">
-            <a:schemeClr val="accent6"/>
+            <a:schemeClr val="accent2"/>
           </a:fillRef>
           <a:effectRef idx="0">
-            <a:schemeClr val="accent6"/>
+            <a:schemeClr val="accent2"/>
           </a:effectRef>
           <a:fontRef idx="minor">
             <a:schemeClr val="lt1"/>
           </a:fontRef>
         </p:style>
         <p:txBody>
-          <a:bodyPr>
-            <a:normAutofit fontScale="92500" lnSpcReduction="20000"/>
-          </a:bodyPr>
+          <a:bodyPr/>
           <a:lstStyle/>
           <a:p>
             <a:r>
               <a:rPr lang="en-US" dirty="0" smtClean="0"/>
-              <a:t>Basic queue properties</a:t>
-            </a:r>
-            <a:r>
-              <a:rPr lang="en-US" dirty="0"/>
-              <a:t>: </a:t>
-            </a:r>
-            <a:endParaRPr lang="en-US" dirty="0" smtClean="0"/>
+              <a:t>Producers only interact with Exchanges</a:t>
+            </a:r>
+          </a:p>
+          <a:p>
+            <a:r>
+              <a:rPr lang="en-US" dirty="0" smtClean="0"/>
+              <a:t>Consumers interact with Message Queues</a:t>
+            </a:r>
+          </a:p>
+          <a:p>
+            <a:r>
+              <a:rPr lang="en-US" dirty="0" smtClean="0"/>
+              <a:t>Consumers aren’t passive</a:t>
+            </a:r>
           </a:p>
           <a:p>
             <a:pPr lvl="1"/>
             <a:r>
-              <a:rPr lang="en-US" dirty="0"/>
-              <a:t>P</a:t>
-            </a:r>
-            <a:r>
-              <a:rPr lang="en-US" dirty="0" smtClean="0"/>
-              <a:t>rivate </a:t>
-            </a:r>
-            <a:r>
-              <a:rPr lang="en-US" dirty="0"/>
-              <a:t>or </a:t>
-            </a:r>
-            <a:r>
-              <a:rPr lang="en-US" dirty="0" smtClean="0"/>
-              <a:t>shared</a:t>
+              <a:rPr lang="en-US" dirty="0" smtClean="0"/>
+              <a:t>Can create and destroy message queues</a:t>
+            </a:r>
+          </a:p>
+          <a:p>
+            <a:r>
+              <a:rPr lang="en-US" dirty="0" smtClean="0"/>
+              <a:t>The same application can act as both a publisher and a consumer</a:t>
             </a:r>
           </a:p>
           <a:p>
             <a:pPr lvl="1"/>
             <a:r>
-              <a:rPr lang="en-US" dirty="0"/>
-              <a:t>D</a:t>
-            </a:r>
-            <a:r>
-              <a:rPr lang="en-US" dirty="0" smtClean="0"/>
-              <a:t>urable </a:t>
-            </a:r>
-            <a:r>
-              <a:rPr lang="en-US" dirty="0"/>
-              <a:t>or </a:t>
-            </a:r>
-            <a:r>
-              <a:rPr lang="en-US" dirty="0" smtClean="0"/>
-              <a:t>temporary</a:t>
+              <a:rPr lang="en-US" dirty="0" smtClean="0"/>
+              <a:t>You can implement Request-Response with AMQP</a:t>
             </a:r>
           </a:p>
           <a:p>
             <a:pPr lvl="1"/>
             <a:r>
-              <a:rPr lang="en-US" dirty="0"/>
-              <a:t>C</a:t>
-            </a:r>
-            <a:r>
-              <a:rPr lang="en-US" dirty="0" smtClean="0"/>
-              <a:t>lient-named </a:t>
-            </a:r>
-            <a:r>
-              <a:rPr lang="en-US" dirty="0"/>
-              <a:t>or server- named, etc. </a:t>
-            </a:r>
-            <a:endParaRPr lang="en-US" dirty="0" smtClean="0"/>
-          </a:p>
-          <a:p>
-            <a:r>
-              <a:rPr lang="en-US" dirty="0" smtClean="0"/>
-              <a:t>Combine these to make all kinds of queues, such as</a:t>
-            </a:r>
-          </a:p>
-          <a:p>
-            <a:r>
-              <a:rPr lang="en-US" b="1" dirty="0" smtClean="0"/>
-              <a:t>Store-and-forward queue</a:t>
-            </a:r>
-            <a:r>
-              <a:rPr lang="en-US" dirty="0" smtClean="0"/>
-              <a:t>: holds </a:t>
-            </a:r>
-            <a:r>
-              <a:rPr lang="en-US" dirty="0"/>
-              <a:t>messages and distributes these between consumers on a round-robin basis. </a:t>
-            </a:r>
-            <a:endParaRPr lang="en-US" dirty="0" smtClean="0"/>
+              <a:rPr lang="en-US" dirty="0" smtClean="0"/>
+              <a:t>Except the publisher doesn’t block</a:t>
+            </a:r>
+            <a:endParaRPr lang="en-US" dirty="0"/>
+          </a:p>
+          <a:p>
+            <a:r>
+              <a:rPr lang="en-US" dirty="0" smtClean="0"/>
+              <a:t>Ex: your application may want an ACK or NACK when it publishes</a:t>
+            </a:r>
           </a:p>
           <a:p>
             <a:pPr lvl="1"/>
             <a:r>
-              <a:rPr lang="en-US" dirty="0"/>
-              <a:t>D</a:t>
-            </a:r>
-            <a:r>
-              <a:rPr lang="en-US" dirty="0" smtClean="0"/>
-              <a:t>urable </a:t>
-            </a:r>
-            <a:r>
-              <a:rPr lang="en-US" dirty="0"/>
-              <a:t>and shared between multiple consumers. </a:t>
-            </a:r>
-          </a:p>
-          <a:p>
-            <a:r>
-              <a:rPr lang="en-US" b="1" dirty="0"/>
-              <a:t>P</a:t>
-            </a:r>
-            <a:r>
-              <a:rPr lang="en-US" b="1" dirty="0" smtClean="0"/>
-              <a:t>rivate </a:t>
-            </a:r>
-            <a:r>
-              <a:rPr lang="en-US" b="1" dirty="0"/>
-              <a:t>reply </a:t>
-            </a:r>
-            <a:r>
-              <a:rPr lang="en-US" b="1" dirty="0" smtClean="0"/>
-              <a:t>queue</a:t>
-            </a:r>
-            <a:r>
-              <a:rPr lang="en-US" dirty="0" smtClean="0"/>
-              <a:t>: holds </a:t>
-            </a:r>
-            <a:r>
-              <a:rPr lang="en-US" dirty="0"/>
-              <a:t>messages and forwards these to a single consumer. </a:t>
-            </a:r>
-            <a:endParaRPr lang="en-US" dirty="0" smtClean="0"/>
-          </a:p>
-          <a:p>
-            <a:pPr lvl="1"/>
-            <a:r>
-              <a:rPr lang="en-US" dirty="0" smtClean="0"/>
-              <a:t>Reply </a:t>
-            </a:r>
-            <a:r>
-              <a:rPr lang="en-US" dirty="0"/>
-              <a:t>queues are typically temporary, server-named, and private to one consumer. </a:t>
-            </a:r>
-          </a:p>
-          <a:p>
-            <a:r>
-              <a:rPr lang="en-US" b="1" dirty="0"/>
-              <a:t>P</a:t>
-            </a:r>
-            <a:r>
-              <a:rPr lang="en-US" b="1" dirty="0" smtClean="0"/>
-              <a:t>rivate </a:t>
-            </a:r>
-            <a:r>
-              <a:rPr lang="en-US" b="1" dirty="0"/>
-              <a:t>subscription </a:t>
-            </a:r>
-            <a:r>
-              <a:rPr lang="en-US" b="1" dirty="0" smtClean="0"/>
-              <a:t>queue</a:t>
-            </a:r>
-            <a:r>
-              <a:rPr lang="en-US" dirty="0" smtClean="0"/>
-              <a:t>: holds </a:t>
-            </a:r>
-            <a:r>
-              <a:rPr lang="en-US" dirty="0"/>
-              <a:t>messages collected from various "subscribed" sources, and forwards these to a single consumer. </a:t>
-            </a:r>
-            <a:endParaRPr lang="en-US" dirty="0" smtClean="0"/>
-          </a:p>
-          <a:p>
-            <a:pPr lvl="1"/>
-            <a:r>
-              <a:rPr lang="en-US" dirty="0" smtClean="0"/>
-              <a:t>Temporary, server-named, and private</a:t>
-            </a:r>
-            <a:endParaRPr lang="en-US" dirty="0"/>
+              <a:rPr lang="en-US" dirty="0" smtClean="0"/>
+              <a:t>This is a reply queue</a:t>
+            </a:r>
           </a:p>
         </p:txBody>
       </p:sp>
     </p:spTree>
     <p:extLst>
       <p:ext uri="{BB962C8B-B14F-4D97-AF65-F5344CB8AC3E}">
-        <p14:creationId xmlns:p14="http://schemas.microsoft.com/office/powerpoint/2010/main" val="1060926783"/>
+        <p14:creationId xmlns:p14="http://schemas.microsoft.com/office/powerpoint/2010/main" val="394498896"/>
       </p:ext>
     </p:extLst>
   </p:cSld>
@@ -10010,7 +9404,7 @@
           <a:p>
             <a:r>
               <a:rPr lang="en-US" dirty="0" smtClean="0"/>
-              <a:t>Consumers and Message Queues</a:t>
+              <a:t>Message Queue Properties and Examples</a:t>
             </a:r>
             <a:endParaRPr lang="en-US" dirty="0"/>
           </a:p>
@@ -10026,72 +9420,213 @@
             <p:ph idx="1"/>
           </p:nvPr>
         </p:nvSpPr>
-        <p:spPr/>
+        <p:spPr>
+          <a:xfrm>
+            <a:off x="838200" y="1694992"/>
+            <a:ext cx="10515600" cy="4940585"/>
+          </a:xfrm>
+        </p:spPr>
+        <p:style>
+          <a:lnRef idx="2">
+            <a:schemeClr val="accent6">
+              <a:shade val="50000"/>
+            </a:schemeClr>
+          </a:lnRef>
+          <a:fillRef idx="1">
+            <a:schemeClr val="accent6"/>
+          </a:fillRef>
+          <a:effectRef idx="0">
+            <a:schemeClr val="accent6"/>
+          </a:effectRef>
+          <a:fontRef idx="minor">
+            <a:schemeClr val="lt1"/>
+          </a:fontRef>
+        </p:style>
         <p:txBody>
           <a:bodyPr>
-            <a:normAutofit/>
+            <a:normAutofit fontScale="92500" lnSpcReduction="20000"/>
           </a:bodyPr>
           <a:lstStyle/>
           <a:p>
             <a:r>
               <a:rPr lang="en-US" dirty="0" smtClean="0"/>
-              <a:t>AMQP Consumers can create their own queues and bind them to Exchanges</a:t>
-            </a:r>
-          </a:p>
-          <a:p>
-            <a:r>
-              <a:rPr lang="en-US" dirty="0" smtClean="0"/>
-              <a:t>Queues can have more than one attached consumer</a:t>
-            </a:r>
-          </a:p>
-          <a:p>
-            <a:r>
-              <a:rPr lang="en-US" dirty="0" smtClean="0"/>
-              <a:t>AMQP queues are FIFO</a:t>
-            </a:r>
+              <a:t>Basic queue properties</a:t>
+            </a:r>
+            <a:r>
+              <a:rPr lang="en-US" dirty="0"/>
+              <a:t>: </a:t>
+            </a:r>
+            <a:endParaRPr lang="en-US" dirty="0" smtClean="0"/>
           </a:p>
           <a:p>
             <a:pPr lvl="1"/>
             <a:r>
-              <a:rPr lang="en-US" dirty="0" smtClean="0"/>
-              <a:t>AMQP allows only one consumer per queue to receive the message.</a:t>
+              <a:rPr lang="en-US" dirty="0"/>
+              <a:t>P</a:t>
+            </a:r>
+            <a:r>
+              <a:rPr lang="en-US" dirty="0" smtClean="0"/>
+              <a:t>rivate </a:t>
+            </a:r>
+            <a:r>
+              <a:rPr lang="en-US" dirty="0"/>
+              <a:t>or </a:t>
+            </a:r>
+            <a:r>
+              <a:rPr lang="en-US" dirty="0" smtClean="0"/>
+              <a:t>shared</a:t>
             </a:r>
           </a:p>
           <a:p>
             <a:pPr lvl="1"/>
             <a:r>
-              <a:rPr lang="en-US" dirty="0" smtClean="0"/>
-              <a:t>Use round-robin delivery if &gt; 1 attached consumer.</a:t>
-            </a:r>
-          </a:p>
-          <a:p>
-            <a:r>
-              <a:rPr lang="en-US" dirty="0" smtClean="0"/>
-              <a:t>If you need &gt; 1 consumer to receive a message, you can give each consumer their own queue.</a:t>
+              <a:rPr lang="en-US" dirty="0"/>
+              <a:t>D</a:t>
+            </a:r>
+            <a:r>
+              <a:rPr lang="en-US" dirty="0" smtClean="0"/>
+              <a:t>urable </a:t>
+            </a:r>
+            <a:r>
+              <a:rPr lang="en-US" dirty="0"/>
+              <a:t>or </a:t>
+            </a:r>
+            <a:r>
+              <a:rPr lang="en-US" dirty="0" smtClean="0"/>
+              <a:t>temporary</a:t>
             </a:r>
           </a:p>
           <a:p>
             <a:pPr lvl="1"/>
             <a:r>
-              <a:rPr lang="en-US" dirty="0" smtClean="0"/>
-              <a:t>Each Queue can attach to the same Exchange, or you can use topic </a:t>
-            </a:r>
-            <a:r>
-              <a:rPr lang="en-US" smtClean="0"/>
-              <a:t>matching</a:t>
-            </a:r>
-            <a:r>
-              <a:rPr lang="en-US" smtClean="0"/>
-              <a:t>.</a:t>
+              <a:rPr lang="en-US" dirty="0"/>
+              <a:t>C</a:t>
+            </a:r>
+            <a:r>
+              <a:rPr lang="en-US" dirty="0" smtClean="0"/>
+              <a:t>lient-named </a:t>
+            </a:r>
+            <a:r>
+              <a:rPr lang="en-US" dirty="0"/>
+              <a:t>or server- named, etc. </a:t>
             </a:r>
             <a:endParaRPr lang="en-US" dirty="0" smtClean="0"/>
+          </a:p>
+          <a:p>
+            <a:r>
+              <a:rPr lang="en-US" dirty="0" smtClean="0"/>
+              <a:t>Combine these to make all kinds of queues, such as</a:t>
+            </a:r>
+          </a:p>
+          <a:p>
+            <a:r>
+              <a:rPr lang="en-US" b="1" dirty="0" smtClean="0"/>
+              <a:t>Store-and-forward queue</a:t>
+            </a:r>
+            <a:r>
+              <a:rPr lang="en-US" dirty="0" smtClean="0"/>
+              <a:t>: holds </a:t>
+            </a:r>
+            <a:r>
+              <a:rPr lang="en-US" dirty="0"/>
+              <a:t>messages and distributes these between consumers on a round-robin basis. </a:t>
+            </a:r>
+            <a:endParaRPr lang="en-US" dirty="0" smtClean="0"/>
+          </a:p>
+          <a:p>
+            <a:pPr lvl="1"/>
+            <a:r>
+              <a:rPr lang="en-US" dirty="0"/>
+              <a:t>D</a:t>
+            </a:r>
+            <a:r>
+              <a:rPr lang="en-US" dirty="0" smtClean="0"/>
+              <a:t>urable </a:t>
+            </a:r>
+            <a:r>
+              <a:rPr lang="en-US" dirty="0"/>
+              <a:t>and shared between multiple consumers. </a:t>
+            </a:r>
+          </a:p>
+          <a:p>
+            <a:r>
+              <a:rPr lang="en-US" b="1" dirty="0"/>
+              <a:t>P</a:t>
+            </a:r>
+            <a:r>
+              <a:rPr lang="en-US" b="1" dirty="0" smtClean="0"/>
+              <a:t>rivate </a:t>
+            </a:r>
+            <a:r>
+              <a:rPr lang="en-US" b="1" dirty="0"/>
+              <a:t>reply </a:t>
+            </a:r>
+            <a:r>
+              <a:rPr lang="en-US" b="1" dirty="0" smtClean="0"/>
+              <a:t>queue</a:t>
+            </a:r>
+            <a:r>
+              <a:rPr lang="en-US" dirty="0" smtClean="0"/>
+              <a:t>: holds </a:t>
+            </a:r>
+            <a:r>
+              <a:rPr lang="en-US" dirty="0"/>
+              <a:t>messages and forwards these to a single consumer. </a:t>
+            </a:r>
+            <a:endParaRPr lang="en-US" dirty="0" smtClean="0"/>
+          </a:p>
+          <a:p>
+            <a:pPr lvl="1"/>
+            <a:r>
+              <a:rPr lang="en-US" dirty="0" smtClean="0"/>
+              <a:t>Reply </a:t>
+            </a:r>
+            <a:r>
+              <a:rPr lang="en-US" dirty="0"/>
+              <a:t>queues are typically temporary, server-named, and private to one consumer. </a:t>
+            </a:r>
+          </a:p>
+          <a:p>
+            <a:r>
+              <a:rPr lang="en-US" b="1" dirty="0"/>
+              <a:t>P</a:t>
+            </a:r>
+            <a:r>
+              <a:rPr lang="en-US" b="1" dirty="0" smtClean="0"/>
+              <a:t>rivate </a:t>
+            </a:r>
+            <a:r>
+              <a:rPr lang="en-US" b="1" dirty="0"/>
+              <a:t>subscription </a:t>
+            </a:r>
+            <a:r>
+              <a:rPr lang="en-US" b="1" dirty="0" smtClean="0"/>
+              <a:t>queue</a:t>
+            </a:r>
+            <a:r>
+              <a:rPr lang="en-US" dirty="0" smtClean="0"/>
+              <a:t>: holds </a:t>
+            </a:r>
+            <a:r>
+              <a:rPr lang="en-US" dirty="0"/>
+              <a:t>messages collected from various "subscribed" sources, and forwards these to a single consumer. </a:t>
+            </a:r>
+            <a:endParaRPr lang="en-US" dirty="0" smtClean="0"/>
+          </a:p>
+          <a:p>
+            <a:pPr lvl="1"/>
+            <a:r>
+              <a:rPr lang="en-US" dirty="0" smtClean="0"/>
+              <a:t>Temporary, server-named, and private</a:t>
+            </a:r>
+            <a:endParaRPr lang="en-US" dirty="0"/>
           </a:p>
         </p:txBody>
       </p:sp>
     </p:spTree>
     <p:extLst>
       <p:ext uri="{BB962C8B-B14F-4D97-AF65-F5344CB8AC3E}">
-        <p14:creationId xmlns:p14="http://schemas.microsoft.com/office/powerpoint/2010/main" val="500591770"/>
+        <p14:creationId xmlns:p14="http://schemas.microsoft.com/office/powerpoint/2010/main" val="1060926783"/>
       </p:ext>
     </p:extLst>
   </p:cSld>
@@ -10142,7 +9677,7 @@
           <a:p>
             <a:r>
               <a:rPr lang="en-US" dirty="0" smtClean="0"/>
-              <a:t>The Exchange</a:t>
+              <a:t>Consumers and Message Queues</a:t>
             </a:r>
             <a:endParaRPr lang="en-US" dirty="0"/>
           </a:p>
@@ -10159,84 +9694,67 @@
           </p:nvPr>
         </p:nvSpPr>
         <p:spPr/>
-        <p:style>
-          <a:lnRef idx="2">
-            <a:schemeClr val="accent6">
-              <a:shade val="50000"/>
-            </a:schemeClr>
-          </a:lnRef>
-          <a:fillRef idx="1">
-            <a:schemeClr val="accent6"/>
-          </a:fillRef>
-          <a:effectRef idx="0">
-            <a:schemeClr val="accent6"/>
-          </a:effectRef>
-          <a:fontRef idx="minor">
-            <a:schemeClr val="lt1"/>
-          </a:fontRef>
-        </p:style>
-        <p:txBody>
-          <a:bodyPr/>
+        <p:txBody>
+          <a:bodyPr>
+            <a:normAutofit/>
+          </a:bodyPr>
           <a:lstStyle/>
           <a:p>
             <a:r>
               <a:rPr lang="en-US" dirty="0" smtClean="0"/>
-              <a:t>Receives messages</a:t>
-            </a:r>
-          </a:p>
-          <a:p>
-            <a:r>
-              <a:rPr lang="en-US" dirty="0" smtClean="0"/>
-              <a:t>Inspects a message header, body, and properties</a:t>
-            </a:r>
-          </a:p>
-          <a:p>
-            <a:r>
-              <a:rPr lang="en-US" dirty="0" smtClean="0"/>
-              <a:t>Routes messages to appropriate message queues</a:t>
-            </a:r>
-          </a:p>
-          <a:p>
-            <a:r>
-              <a:rPr lang="en-US" dirty="0" smtClean="0"/>
-              <a:t>Routing usually done with </a:t>
-            </a:r>
-            <a:r>
-              <a:rPr lang="en-US" b="1" dirty="0" smtClean="0"/>
-              <a:t>routing keys</a:t>
-            </a:r>
-            <a:r>
-              <a:rPr lang="en-US" dirty="0" smtClean="0"/>
-              <a:t> in the message payload</a:t>
+              <a:t>AMQP Consumers can create their own queues and bind them to Exchanges</a:t>
+            </a:r>
+          </a:p>
+          <a:p>
+            <a:r>
+              <a:rPr lang="en-US" dirty="0" smtClean="0"/>
+              <a:t>Queues can have more than one attached consumer</a:t>
+            </a:r>
+          </a:p>
+          <a:p>
+            <a:r>
+              <a:rPr lang="en-US" dirty="0" smtClean="0"/>
+              <a:t>AMQP queues are FIFO</a:t>
             </a:r>
           </a:p>
           <a:p>
             <a:pPr lvl="1"/>
             <a:r>
               <a:rPr lang="en-US" dirty="0" smtClean="0"/>
-              <a:t>For point-to-point messages, the routing key is the name of the message queue</a:t>
+              <a:t>AMQP allows only one consumer per queue to receive the message.</a:t>
             </a:r>
           </a:p>
           <a:p>
             <a:pPr lvl="1"/>
             <a:r>
               <a:rPr lang="en-US" dirty="0" smtClean="0"/>
-              <a:t>For pub-sub routing, the routing key is the name of the topic</a:t>
-            </a:r>
-          </a:p>
-          <a:p>
-            <a:pPr lvl="2"/>
-            <a:r>
-              <a:rPr lang="en-US" dirty="0" smtClean="0"/>
-              <a:t>Topics can be hierarchical</a:t>
-            </a:r>
+              <a:t>Use round-robin delivery if &gt; 1 attached consumer.</a:t>
+            </a:r>
+          </a:p>
+          <a:p>
+            <a:r>
+              <a:rPr lang="en-US" dirty="0" smtClean="0"/>
+              <a:t>If you need &gt; 1 consumer to receive a message, you can give each consumer their own queue.</a:t>
+            </a:r>
+          </a:p>
+          <a:p>
+            <a:pPr lvl="1"/>
+            <a:r>
+              <a:rPr lang="en-US" dirty="0" smtClean="0"/>
+              <a:t>Each Queue can attach to the same Exchange, or you can use topic </a:t>
+            </a:r>
+            <a:r>
+              <a:rPr lang="en-US" smtClean="0"/>
+              <a:t>matching.</a:t>
+            </a:r>
+            <a:endParaRPr lang="en-US" dirty="0" smtClean="0"/>
           </a:p>
         </p:txBody>
       </p:sp>
     </p:spTree>
     <p:extLst>
       <p:ext uri="{BB962C8B-B14F-4D97-AF65-F5344CB8AC3E}">
-        <p14:creationId xmlns:p14="http://schemas.microsoft.com/office/powerpoint/2010/main" val="439720840"/>
+        <p14:creationId xmlns:p14="http://schemas.microsoft.com/office/powerpoint/2010/main" val="500591770"/>
       </p:ext>
     </p:extLst>
   </p:cSld>
@@ -10287,7 +9805,7 @@
           <a:p>
             <a:r>
               <a:rPr lang="en-US" dirty="0" smtClean="0"/>
-              <a:t>Publish-Subscribe Patterns</a:t>
+              <a:t>The Exchange</a:t>
             </a:r>
             <a:endParaRPr lang="en-US" dirty="0"/>
           </a:p>
@@ -10306,110 +9824,82 @@
         <p:spPr/>
         <p:style>
           <a:lnRef idx="2">
-            <a:schemeClr val="dk1"/>
+            <a:schemeClr val="accent6">
+              <a:shade val="50000"/>
+            </a:schemeClr>
           </a:lnRef>
           <a:fillRef idx="1">
-            <a:schemeClr val="lt1"/>
+            <a:schemeClr val="accent6"/>
           </a:fillRef>
           <a:effectRef idx="0">
-            <a:schemeClr val="dk1"/>
+            <a:schemeClr val="accent6"/>
           </a:effectRef>
           <a:fontRef idx="minor">
-            <a:schemeClr val="dk1"/>
+            <a:schemeClr val="lt1"/>
           </a:fontRef>
         </p:style>
         <p:txBody>
-          <a:bodyPr>
-            <a:normAutofit lnSpcReduction="10000"/>
-          </a:bodyPr>
+          <a:bodyPr/>
           <a:lstStyle/>
           <a:p>
             <a:r>
-              <a:rPr lang="en-US" dirty="0"/>
-              <a:t>Useful for many-to-many </a:t>
-            </a:r>
-            <a:r>
-              <a:rPr lang="en-US" dirty="0" smtClean="0"/>
-              <a:t>messaging</a:t>
-            </a:r>
-          </a:p>
-          <a:p>
-            <a:r>
-              <a:rPr lang="en-US" dirty="0" smtClean="0"/>
-              <a:t>In </a:t>
-            </a:r>
-            <a:r>
-              <a:rPr lang="en-US" dirty="0" err="1" smtClean="0"/>
-              <a:t>microservice</a:t>
-            </a:r>
-            <a:r>
-              <a:rPr lang="en-US" dirty="0" smtClean="0"/>
-              <a:t>-based systems, several different types of components may want to receive the same message</a:t>
+              <a:rPr lang="en-US" dirty="0" smtClean="0"/>
+              <a:t>Receives messages</a:t>
+            </a:r>
+          </a:p>
+          <a:p>
+            <a:r>
+              <a:rPr lang="en-US" dirty="0" smtClean="0"/>
+              <a:t>Inspects a message header, body, and properties</a:t>
+            </a:r>
+          </a:p>
+          <a:p>
+            <a:r>
+              <a:rPr lang="en-US" dirty="0" smtClean="0"/>
+              <a:t>Routes messages to appropriate message queues</a:t>
+            </a:r>
+          </a:p>
+          <a:p>
+            <a:r>
+              <a:rPr lang="en-US" dirty="0" smtClean="0"/>
+              <a:t>Routing usually done with </a:t>
+            </a:r>
+            <a:r>
+              <a:rPr lang="en-US" b="1" dirty="0" smtClean="0"/>
+              <a:t>routing keys</a:t>
+            </a:r>
+            <a:r>
+              <a:rPr lang="en-US" dirty="0" smtClean="0"/>
+              <a:t> in the message payload</a:t>
             </a:r>
           </a:p>
           <a:p>
             <a:pPr lvl="1"/>
             <a:r>
               <a:rPr lang="en-US" dirty="0" smtClean="0"/>
-              <a:t>But take different actions</a:t>
+              <a:t>For point-to-point messages, the routing key is the name of the message queue</a:t>
             </a:r>
           </a:p>
           <a:p>
             <a:pPr lvl="1"/>
             <a:r>
               <a:rPr lang="en-US" dirty="0" smtClean="0"/>
-              <a:t>Ex: you can always add a logger service</a:t>
-            </a:r>
-          </a:p>
-          <a:p>
-            <a:r>
-              <a:rPr lang="en-US" dirty="0" smtClean="0"/>
-              <a:t>You can always do this with explicitly named routing keys.</a:t>
-            </a:r>
-          </a:p>
-          <a:p>
-            <a:r>
-              <a:rPr lang="en-US" dirty="0" smtClean="0"/>
-              <a:t>You may also want to use hierarchical (name space) key names and pattern matching.</a:t>
-            </a:r>
-          </a:p>
-          <a:p>
-            <a:pPr lvl="1"/>
-            <a:r>
-              <a:rPr lang="en-US" dirty="0" err="1"/>
-              <a:t>g</a:t>
-            </a:r>
-            <a:r>
-              <a:rPr lang="en-US" dirty="0" err="1" smtClean="0"/>
-              <a:t>ateway.jobs.jobtype.gromacs</a:t>
-            </a:r>
-            <a:endParaRPr lang="en-US" dirty="0" smtClean="0"/>
-          </a:p>
-          <a:p>
-            <a:pPr lvl="1"/>
-            <a:r>
-              <a:rPr lang="en-US" dirty="0" err="1"/>
-              <a:t>g</a:t>
-            </a:r>
-            <a:r>
-              <a:rPr lang="en-US" dirty="0" err="1" smtClean="0"/>
-              <a:t>ateway.jobs.jobtype</a:t>
-            </a:r>
-            <a:r>
-              <a:rPr lang="en-US" dirty="0" smtClean="0"/>
-              <a:t>.*</a:t>
-            </a:r>
-            <a:endParaRPr lang="en-US" dirty="0"/>
-          </a:p>
-          <a:p>
-            <a:endParaRPr lang="en-US" dirty="0"/>
+              <a:t>For pub-sub routing, the routing key is the name of the topic</a:t>
+            </a:r>
+          </a:p>
+          <a:p>
+            <a:pPr lvl="2"/>
+            <a:r>
+              <a:rPr lang="en-US" dirty="0" smtClean="0"/>
+              <a:t>Topics can be hierarchical</a:t>
+            </a:r>
           </a:p>
         </p:txBody>
       </p:sp>
     </p:spTree>
     <p:extLst>
       <p:ext uri="{BB962C8B-B14F-4D97-AF65-F5344CB8AC3E}">
-        <p14:creationId xmlns:p14="http://schemas.microsoft.com/office/powerpoint/2010/main" val="508865453"/>
+        <p14:creationId xmlns:p14="http://schemas.microsoft.com/office/powerpoint/2010/main" val="439720840"/>
       </p:ext>
     </p:extLst>
   </p:cSld>
@@ -10460,7 +9950,7 @@
           <a:p>
             <a:r>
               <a:rPr lang="en-US" dirty="0" smtClean="0"/>
-              <a:t>The Message Payload</a:t>
+              <a:t>Publish-Subscribe Patterns</a:t>
             </a:r>
             <a:endParaRPr lang="en-US" dirty="0"/>
           </a:p>
@@ -10478,77 +9968,111 @@
         </p:nvSpPr>
         <p:spPr/>
         <p:style>
-          <a:lnRef idx="3">
-            <a:schemeClr val="lt1"/>
+          <a:lnRef idx="2">
+            <a:schemeClr val="dk1"/>
           </a:lnRef>
           <a:fillRef idx="1">
-            <a:schemeClr val="accent2"/>
+            <a:schemeClr val="lt1"/>
           </a:fillRef>
-          <a:effectRef idx="1">
-            <a:schemeClr val="accent2"/>
+          <a:effectRef idx="0">
+            <a:schemeClr val="dk1"/>
           </a:effectRef>
           <a:fontRef idx="minor">
-            <a:schemeClr val="lt1"/>
+            <a:schemeClr val="dk1"/>
           </a:fontRef>
         </p:style>
         <p:txBody>
-          <a:bodyPr/>
+          <a:bodyPr>
+            <a:normAutofit lnSpcReduction="10000"/>
+          </a:bodyPr>
           <a:lstStyle/>
           <a:p>
             <a:r>
-              <a:rPr lang="en-US" dirty="0" smtClean="0"/>
-              <a:t>Read the specification for more details.</a:t>
-            </a:r>
-          </a:p>
-          <a:p>
-            <a:r>
-              <a:rPr lang="en-US" dirty="0" smtClean="0"/>
-              <a:t>In general AMQP follows the head-body format</a:t>
-            </a:r>
-          </a:p>
-          <a:p>
-            <a:r>
-              <a:rPr lang="en-US" dirty="0" smtClean="0"/>
-              <a:t>The message body payload is binary</a:t>
-            </a:r>
-          </a:p>
-          <a:p>
-            <a:r>
-              <a:rPr lang="en-US" dirty="0" smtClean="0"/>
-              <a:t>AMQP assumes the content is handled by consumers</a:t>
+              <a:rPr lang="en-US" dirty="0"/>
+              <a:t>Useful for many-to-many </a:t>
+            </a:r>
+            <a:r>
+              <a:rPr lang="en-US" dirty="0" smtClean="0"/>
+              <a:t>messaging</a:t>
+            </a:r>
+          </a:p>
+          <a:p>
+            <a:r>
+              <a:rPr lang="en-US" dirty="0" smtClean="0"/>
+              <a:t>In </a:t>
+            </a:r>
+            <a:r>
+              <a:rPr lang="en-US" dirty="0" err="1" smtClean="0"/>
+              <a:t>microservice</a:t>
+            </a:r>
+            <a:r>
+              <a:rPr lang="en-US" dirty="0" smtClean="0"/>
+              <a:t>-based systems, several different types of components may want to receive the same message</a:t>
             </a:r>
           </a:p>
           <a:p>
             <a:pPr lvl="1"/>
             <a:r>
               <a:rPr lang="en-US" dirty="0" smtClean="0"/>
-              <a:t>The message body is opaque to the AMQP server.</a:t>
-            </a:r>
-          </a:p>
-          <a:p>
-            <a:r>
-              <a:rPr lang="en-US" dirty="0" smtClean="0"/>
-              <a:t>You could serialize your content with JSON or Thrift and </a:t>
+              <a:t>But take different actions</a:t>
+            </a:r>
+          </a:p>
+          <a:p>
+            <a:pPr lvl="1"/>
+            <a:r>
+              <a:rPr lang="en-US" dirty="0" smtClean="0"/>
+              <a:t>Ex: you can always add a logger service</a:t>
+            </a:r>
+          </a:p>
+          <a:p>
+            <a:r>
+              <a:rPr lang="en-US" dirty="0" smtClean="0"/>
+              <a:t>You can always do this with explicitly named routing keys.</a:t>
+            </a:r>
+          </a:p>
+          <a:p>
+            <a:r>
+              <a:rPr lang="en-US" dirty="0" smtClean="0"/>
+              <a:t>You may also want to use hierarchical (name space) key names and pattern matching.</a:t>
+            </a:r>
+          </a:p>
+          <a:p>
+            <a:pPr lvl="1"/>
+            <a:r>
+              <a:rPr lang="en-US" dirty="0" err="1"/>
+              <a:t>g</a:t>
             </a:r>
             <a:r>
               <a:rPr lang="en-US" dirty="0" err="1" smtClean="0"/>
-              <a:t>deserialize</a:t>
-            </a:r>
-            <a:r>
-              <a:rPr lang="en-US" dirty="0"/>
-              <a:t> </a:t>
-            </a:r>
-            <a:r>
-              <a:rPr lang="en-US" dirty="0" smtClean="0"/>
-              <a:t>it to directly send objects.</a:t>
-            </a:r>
+              <a:t>ateway.jobs.jobtype.gromacs</a:t>
+            </a:r>
+            <a:endParaRPr lang="en-US" dirty="0" smtClean="0"/>
+          </a:p>
+          <a:p>
+            <a:pPr lvl="1"/>
+            <a:r>
+              <a:rPr lang="en-US" dirty="0" err="1"/>
+              <a:t>g</a:t>
+            </a:r>
+            <a:r>
+              <a:rPr lang="en-US" dirty="0" err="1" smtClean="0"/>
+              <a:t>ateway.jobs.jobtype</a:t>
+            </a:r>
+            <a:r>
+              <a:rPr lang="en-US" dirty="0" smtClean="0"/>
+              <a:t>.*</a:t>
+            </a:r>
+            <a:endParaRPr lang="en-US" dirty="0"/>
+          </a:p>
+          <a:p>
+            <a:endParaRPr lang="en-US" dirty="0"/>
           </a:p>
         </p:txBody>
       </p:sp>
     </p:spTree>
     <p:extLst>
       <p:ext uri="{BB962C8B-B14F-4D97-AF65-F5344CB8AC3E}">
-        <p14:creationId xmlns:p14="http://schemas.microsoft.com/office/powerpoint/2010/main" val="1501868842"/>
+        <p14:creationId xmlns:p14="http://schemas.microsoft.com/office/powerpoint/2010/main" val="508865453"/>
       </p:ext>
     </p:extLst>
   </p:cSld>
@@ -10584,6 +10108,145 @@
       </p:grpSpPr>
       <p:sp>
         <p:nvSpPr>
+          <p:cNvPr id="2" name="Title 1"/>
+          <p:cNvSpPr>
+            <a:spLocks noGrp="1"/>
+          </p:cNvSpPr>
+          <p:nvPr>
+            <p:ph type="title"/>
+          </p:nvPr>
+        </p:nvSpPr>
+        <p:spPr/>
+        <p:txBody>
+          <a:bodyPr/>
+          <a:lstStyle/>
+          <a:p>
+            <a:r>
+              <a:rPr lang="en-US" dirty="0" smtClean="0"/>
+              <a:t>The Message Payload</a:t>
+            </a:r>
+            <a:endParaRPr lang="en-US" dirty="0"/>
+          </a:p>
+        </p:txBody>
+      </p:sp>
+      <p:sp>
+        <p:nvSpPr>
+          <p:cNvPr id="3" name="Content Placeholder 2"/>
+          <p:cNvSpPr>
+            <a:spLocks noGrp="1"/>
+          </p:cNvSpPr>
+          <p:nvPr>
+            <p:ph idx="1"/>
+          </p:nvPr>
+        </p:nvSpPr>
+        <p:spPr/>
+        <p:style>
+          <a:lnRef idx="3">
+            <a:schemeClr val="lt1"/>
+          </a:lnRef>
+          <a:fillRef idx="1">
+            <a:schemeClr val="accent2"/>
+          </a:fillRef>
+          <a:effectRef idx="1">
+            <a:schemeClr val="accent2"/>
+          </a:effectRef>
+          <a:fontRef idx="minor">
+            <a:schemeClr val="lt1"/>
+          </a:fontRef>
+        </p:style>
+        <p:txBody>
+          <a:bodyPr/>
+          <a:lstStyle/>
+          <a:p>
+            <a:r>
+              <a:rPr lang="en-US" dirty="0" smtClean="0"/>
+              <a:t>Read the specification for more details.</a:t>
+            </a:r>
+          </a:p>
+          <a:p>
+            <a:r>
+              <a:rPr lang="en-US" dirty="0" smtClean="0"/>
+              <a:t>In general AMQP follows the head-body format</a:t>
+            </a:r>
+          </a:p>
+          <a:p>
+            <a:r>
+              <a:rPr lang="en-US" dirty="0" smtClean="0"/>
+              <a:t>The message body payload is binary</a:t>
+            </a:r>
+          </a:p>
+          <a:p>
+            <a:r>
+              <a:rPr lang="en-US" dirty="0" smtClean="0"/>
+              <a:t>AMQP assumes the content is handled by consumers</a:t>
+            </a:r>
+          </a:p>
+          <a:p>
+            <a:pPr lvl="1"/>
+            <a:r>
+              <a:rPr lang="en-US" dirty="0" smtClean="0"/>
+              <a:t>The message body is opaque to the AMQP server.</a:t>
+            </a:r>
+          </a:p>
+          <a:p>
+            <a:r>
+              <a:rPr lang="en-US" dirty="0" smtClean="0"/>
+              <a:t>You could serialize your content with JSON or Thrift and </a:t>
+            </a:r>
+            <a:r>
+              <a:rPr lang="en-US" dirty="0" err="1" smtClean="0"/>
+              <a:t>deserialize</a:t>
+            </a:r>
+            <a:r>
+              <a:rPr lang="en-US" dirty="0"/>
+              <a:t> </a:t>
+            </a:r>
+            <a:r>
+              <a:rPr lang="en-US" dirty="0" smtClean="0"/>
+              <a:t>it to directly send objects.</a:t>
+            </a:r>
+          </a:p>
+        </p:txBody>
+      </p:sp>
+    </p:spTree>
+    <p:extLst>
+      <p:ext uri="{BB962C8B-B14F-4D97-AF65-F5344CB8AC3E}">
+        <p14:creationId xmlns:p14="http://schemas.microsoft.com/office/powerpoint/2010/main" val="1501868842"/>
+      </p:ext>
+    </p:extLst>
+  </p:cSld>
+  <p:clrMapOvr>
+    <a:masterClrMapping/>
+  </p:clrMapOvr>
+  <p:timing>
+    <p:tnLst>
+      <p:par>
+        <p:cTn id="1" dur="indefinite" restart="never" nodeType="tmRoot"/>
+      </p:par>
+    </p:tnLst>
+  </p:timing>
+</p:sld>
+</file>
+
+<file path=ppt/slides/slide17.xml><?xml version="1.0" encoding="utf-8"?>
+<p:sld xmlns:a="http://schemas.openxmlformats.org/drawingml/2006/main" xmlns:r="http://schemas.openxmlformats.org/officeDocument/2006/relationships" xmlns:p="http://schemas.openxmlformats.org/presentationml/2006/main">
+  <p:cSld>
+    <p:spTree>
+      <p:nvGrpSpPr>
+        <p:cNvPr id="1" name=""/>
+        <p:cNvGrpSpPr/>
+        <p:nvPr/>
+      </p:nvGrpSpPr>
+      <p:grpSpPr>
+        <a:xfrm>
+          <a:off x="0" y="0"/>
+          <a:ext cx="0" cy="0"/>
+          <a:chOff x="0" y="0"/>
+          <a:chExt cx="0" cy="0"/>
+        </a:xfrm>
+      </p:grpSpPr>
+      <p:sp>
+        <p:nvSpPr>
           <p:cNvPr id="4" name="Title 3"/>
           <p:cNvSpPr>
             <a:spLocks noGrp="1"/>
@@ -10644,7 +10307,7 @@
 </p:sld>
 </file>
 
-<file path=ppt/slides/slide17.xml><?xml version="1.0" encoding="utf-8"?>
+<file path=ppt/slides/slide18.xml><?xml version="1.0" encoding="utf-8"?>
 <p:sld xmlns:a="http://schemas.openxmlformats.org/drawingml/2006/main" xmlns:r="http://schemas.openxmlformats.org/officeDocument/2006/relationships" xmlns:p="http://schemas.openxmlformats.org/presentationml/2006/main">
   <p:cSld>
     <p:spTree>
@@ -10914,7 +10577,7 @@
 </p:sld>
 </file>
 
-<file path=ppt/slides/slide18.xml><?xml version="1.0" encoding="utf-8"?>
+<file path=ppt/slides/slide19.xml><?xml version="1.0" encoding="utf-8"?>
 <p:sld xmlns:a="http://schemas.openxmlformats.org/drawingml/2006/main" xmlns:r="http://schemas.openxmlformats.org/officeDocument/2006/relationships" xmlns:p="http://schemas.openxmlformats.org/presentationml/2006/main">
   <p:cSld>
     <p:spTree>
@@ -11072,7 +10735,251 @@
 </p:sld>
 </file>
 
-<file path=ppt/slides/slide19.xml><?xml version="1.0" encoding="utf-8"?>
+<file path=ppt/slides/slide2.xml><?xml version="1.0" encoding="utf-8"?>
+<p:sld xmlns:a="http://schemas.openxmlformats.org/drawingml/2006/main" xmlns:r="http://schemas.openxmlformats.org/officeDocument/2006/relationships" xmlns:p="http://schemas.openxmlformats.org/presentationml/2006/main">
+  <p:cSld>
+    <p:spTree>
+      <p:nvGrpSpPr>
+        <p:cNvPr id="1" name=""/>
+        <p:cNvGrpSpPr/>
+        <p:nvPr/>
+      </p:nvGrpSpPr>
+      <p:grpSpPr>
+        <a:xfrm>
+          <a:off x="0" y="0"/>
+          <a:ext cx="0" cy="0"/>
+          <a:chOff x="0" y="0"/>
+          <a:chExt cx="0" cy="0"/>
+        </a:xfrm>
+      </p:grpSpPr>
+      <p:sp>
+        <p:nvSpPr>
+          <p:cNvPr id="6" name="Rectangle 5"/>
+          <p:cNvSpPr/>
+          <p:nvPr/>
+        </p:nvSpPr>
+        <p:spPr>
+          <a:xfrm>
+            <a:off x="4956171" y="1787357"/>
+            <a:ext cx="2279657" cy="1887374"/>
+          </a:xfrm>
+          <a:prstGeom prst="rect">
+            <a:avLst/>
+          </a:prstGeom>
+        </p:spPr>
+        <p:style>
+          <a:lnRef idx="2">
+            <a:schemeClr val="accent1">
+              <a:shade val="50000"/>
+            </a:schemeClr>
+          </a:lnRef>
+          <a:fillRef idx="1">
+            <a:schemeClr val="accent1"/>
+          </a:fillRef>
+          <a:effectRef idx="0">
+            <a:schemeClr val="accent1"/>
+          </a:effectRef>
+          <a:fontRef idx="minor">
+            <a:schemeClr val="lt1"/>
+          </a:fontRef>
+        </p:style>
+        <p:txBody>
+          <a:bodyPr rtlCol="0" anchor="ctr"/>
+          <a:lstStyle/>
+          <a:p>
+            <a:pPr algn="ctr"/>
+            <a:r>
+              <a:rPr lang="en-US" smtClean="0"/>
+              <a:t>API Server</a:t>
+            </a:r>
+            <a:endParaRPr lang="en-US"/>
+          </a:p>
+        </p:txBody>
+      </p:sp>
+      <p:sp>
+        <p:nvSpPr>
+          <p:cNvPr id="7" name="Rectangle 6"/>
+          <p:cNvSpPr/>
+          <p:nvPr/>
+        </p:nvSpPr>
+        <p:spPr>
+          <a:xfrm>
+            <a:off x="838200" y="4504235"/>
+            <a:ext cx="2279657" cy="1887374"/>
+          </a:xfrm>
+          <a:prstGeom prst="rect">
+            <a:avLst/>
+          </a:prstGeom>
+        </p:spPr>
+        <p:style>
+          <a:lnRef idx="2">
+            <a:schemeClr val="accent1">
+              <a:shade val="50000"/>
+            </a:schemeClr>
+          </a:lnRef>
+          <a:fillRef idx="1">
+            <a:schemeClr val="accent1"/>
+          </a:fillRef>
+          <a:effectRef idx="0">
+            <a:schemeClr val="accent1"/>
+          </a:effectRef>
+          <a:fontRef idx="minor">
+            <a:schemeClr val="lt1"/>
+          </a:fontRef>
+        </p:style>
+        <p:txBody>
+          <a:bodyPr rtlCol="0" anchor="ctr"/>
+          <a:lstStyle/>
+          <a:p>
+            <a:pPr algn="ctr"/>
+            <a:r>
+              <a:rPr lang="en-US" dirty="0" smtClean="0"/>
+              <a:t>Application Manager</a:t>
+            </a:r>
+            <a:endParaRPr lang="en-US" dirty="0"/>
+          </a:p>
+        </p:txBody>
+      </p:sp>
+      <p:sp>
+        <p:nvSpPr>
+          <p:cNvPr id="8" name="Rectangle 7"/>
+          <p:cNvSpPr/>
+          <p:nvPr/>
+        </p:nvSpPr>
+        <p:spPr>
+          <a:xfrm>
+            <a:off x="9074143" y="4504235"/>
+            <a:ext cx="2279657" cy="1887374"/>
+          </a:xfrm>
+          <a:prstGeom prst="rect">
+            <a:avLst/>
+          </a:prstGeom>
+        </p:spPr>
+        <p:style>
+          <a:lnRef idx="2">
+            <a:schemeClr val="accent1">
+              <a:shade val="50000"/>
+            </a:schemeClr>
+          </a:lnRef>
+          <a:fillRef idx="1">
+            <a:schemeClr val="accent1"/>
+          </a:fillRef>
+          <a:effectRef idx="0">
+            <a:schemeClr val="accent1"/>
+          </a:effectRef>
+          <a:fontRef idx="minor">
+            <a:schemeClr val="lt1"/>
+          </a:fontRef>
+        </p:style>
+        <p:txBody>
+          <a:bodyPr rtlCol="0" anchor="ctr"/>
+          <a:lstStyle/>
+          <a:p>
+            <a:pPr algn="ctr"/>
+            <a:r>
+              <a:rPr lang="en-US" dirty="0" smtClean="0"/>
+              <a:t>Metadata Server</a:t>
+            </a:r>
+            <a:endParaRPr lang="en-US" dirty="0"/>
+          </a:p>
+        </p:txBody>
+      </p:sp>
+      <p:sp>
+        <p:nvSpPr>
+          <p:cNvPr id="13" name="Title 12"/>
+          <p:cNvSpPr>
+            <a:spLocks noGrp="1"/>
+          </p:cNvSpPr>
+          <p:nvPr>
+            <p:ph type="title"/>
+          </p:nvPr>
+        </p:nvSpPr>
+        <p:spPr/>
+        <p:txBody>
+          <a:bodyPr/>
+          <a:lstStyle/>
+          <a:p>
+            <a:r>
+              <a:rPr lang="en-US" dirty="0" smtClean="0"/>
+              <a:t>Basic Components of the Gateway App Server</a:t>
+            </a:r>
+            <a:endParaRPr lang="en-US" dirty="0"/>
+          </a:p>
+        </p:txBody>
+      </p:sp>
+      <p:sp>
+        <p:nvSpPr>
+          <p:cNvPr id="12" name="Left-Right-Up Arrow 11"/>
+          <p:cNvSpPr/>
+          <p:nvPr/>
+        </p:nvSpPr>
+        <p:spPr>
+          <a:xfrm>
+            <a:off x="3521676" y="3771400"/>
+            <a:ext cx="5165124" cy="2518190"/>
+          </a:xfrm>
+          <a:prstGeom prst="leftRightUpArrow">
+            <a:avLst>
+              <a:gd name="adj1" fmla="val 26962"/>
+              <a:gd name="adj2" fmla="val 25000"/>
+              <a:gd name="adj3" fmla="val 25000"/>
+            </a:avLst>
+          </a:prstGeom>
+        </p:spPr>
+        <p:style>
+          <a:lnRef idx="2">
+            <a:schemeClr val="accent1">
+              <a:shade val="50000"/>
+            </a:schemeClr>
+          </a:lnRef>
+          <a:fillRef idx="1">
+            <a:schemeClr val="accent1"/>
+          </a:fillRef>
+          <a:effectRef idx="0">
+            <a:schemeClr val="accent1"/>
+          </a:effectRef>
+          <a:fontRef idx="minor">
+            <a:schemeClr val="lt1"/>
+          </a:fontRef>
+        </p:style>
+        <p:txBody>
+          <a:bodyPr rtlCol="0" anchor="ctr"/>
+          <a:lstStyle/>
+          <a:p>
+            <a:pPr algn="ctr"/>
+            <a:r>
+              <a:rPr lang="en-US" dirty="0" smtClean="0"/>
+              <a:t>How do these </a:t>
+            </a:r>
+            <a:r>
+              <a:rPr lang="en-US" smtClean="0"/>
+              <a:t>services communicate?</a:t>
+            </a:r>
+            <a:endParaRPr lang="en-US"/>
+          </a:p>
+        </p:txBody>
+      </p:sp>
+    </p:spTree>
+    <p:extLst>
+      <p:ext uri="{BB962C8B-B14F-4D97-AF65-F5344CB8AC3E}">
+        <p14:creationId xmlns:p14="http://schemas.microsoft.com/office/powerpoint/2010/main" val="1497208460"/>
+      </p:ext>
+    </p:extLst>
+  </p:cSld>
+  <p:clrMapOvr>
+    <a:masterClrMapping/>
+  </p:clrMapOvr>
+  <p:timing>
+    <p:tnLst>
+      <p:par>
+        <p:cTn id="1" dur="indefinite" restart="never" nodeType="tmRoot"/>
+      </p:par>
+    </p:tnLst>
+  </p:timing>
+</p:sld>
+</file>
+
+<file path=ppt/slides/slide20.xml><?xml version="1.0" encoding="utf-8"?>
 <p:sld xmlns:a="http://schemas.openxmlformats.org/drawingml/2006/main" xmlns:r="http://schemas.openxmlformats.org/officeDocument/2006/relationships" xmlns:p="http://schemas.openxmlformats.org/presentationml/2006/main">
   <p:cSld>
     <p:spTree>
@@ -11226,251 +11133,7 @@
 </p:sld>
 </file>
 
-<file path=ppt/slides/slide2.xml><?xml version="1.0" encoding="utf-8"?>
-<p:sld xmlns:a="http://schemas.openxmlformats.org/drawingml/2006/main" xmlns:r="http://schemas.openxmlformats.org/officeDocument/2006/relationships" xmlns:p="http://schemas.openxmlformats.org/presentationml/2006/main">
-  <p:cSld>
-    <p:spTree>
-      <p:nvGrpSpPr>
-        <p:cNvPr id="1" name=""/>
-        <p:cNvGrpSpPr/>
-        <p:nvPr/>
-      </p:nvGrpSpPr>
-      <p:grpSpPr>
-        <a:xfrm>
-          <a:off x="0" y="0"/>
-          <a:ext cx="0" cy="0"/>
-          <a:chOff x="0" y="0"/>
-          <a:chExt cx="0" cy="0"/>
-        </a:xfrm>
-      </p:grpSpPr>
-      <p:sp>
-        <p:nvSpPr>
-          <p:cNvPr id="6" name="Rectangle 5"/>
-          <p:cNvSpPr/>
-          <p:nvPr/>
-        </p:nvSpPr>
-        <p:spPr>
-          <a:xfrm>
-            <a:off x="4956171" y="1787357"/>
-            <a:ext cx="2279657" cy="1887374"/>
-          </a:xfrm>
-          <a:prstGeom prst="rect">
-            <a:avLst/>
-          </a:prstGeom>
-        </p:spPr>
-        <p:style>
-          <a:lnRef idx="2">
-            <a:schemeClr val="accent1">
-              <a:shade val="50000"/>
-            </a:schemeClr>
-          </a:lnRef>
-          <a:fillRef idx="1">
-            <a:schemeClr val="accent1"/>
-          </a:fillRef>
-          <a:effectRef idx="0">
-            <a:schemeClr val="accent1"/>
-          </a:effectRef>
-          <a:fontRef idx="minor">
-            <a:schemeClr val="lt1"/>
-          </a:fontRef>
-        </p:style>
-        <p:txBody>
-          <a:bodyPr rtlCol="0" anchor="ctr"/>
-          <a:lstStyle/>
-          <a:p>
-            <a:pPr algn="ctr"/>
-            <a:r>
-              <a:rPr lang="en-US" smtClean="0"/>
-              <a:t>API Server</a:t>
-            </a:r>
-            <a:endParaRPr lang="en-US"/>
-          </a:p>
-        </p:txBody>
-      </p:sp>
-      <p:sp>
-        <p:nvSpPr>
-          <p:cNvPr id="7" name="Rectangle 6"/>
-          <p:cNvSpPr/>
-          <p:nvPr/>
-        </p:nvSpPr>
-        <p:spPr>
-          <a:xfrm>
-            <a:off x="838200" y="4504235"/>
-            <a:ext cx="2279657" cy="1887374"/>
-          </a:xfrm>
-          <a:prstGeom prst="rect">
-            <a:avLst/>
-          </a:prstGeom>
-        </p:spPr>
-        <p:style>
-          <a:lnRef idx="2">
-            <a:schemeClr val="accent1">
-              <a:shade val="50000"/>
-            </a:schemeClr>
-          </a:lnRef>
-          <a:fillRef idx="1">
-            <a:schemeClr val="accent1"/>
-          </a:fillRef>
-          <a:effectRef idx="0">
-            <a:schemeClr val="accent1"/>
-          </a:effectRef>
-          <a:fontRef idx="minor">
-            <a:schemeClr val="lt1"/>
-          </a:fontRef>
-        </p:style>
-        <p:txBody>
-          <a:bodyPr rtlCol="0" anchor="ctr"/>
-          <a:lstStyle/>
-          <a:p>
-            <a:pPr algn="ctr"/>
-            <a:r>
-              <a:rPr lang="en-US" dirty="0" smtClean="0"/>
-              <a:t>Application Manager</a:t>
-            </a:r>
-            <a:endParaRPr lang="en-US" dirty="0"/>
-          </a:p>
-        </p:txBody>
-      </p:sp>
-      <p:sp>
-        <p:nvSpPr>
-          <p:cNvPr id="8" name="Rectangle 7"/>
-          <p:cNvSpPr/>
-          <p:nvPr/>
-        </p:nvSpPr>
-        <p:spPr>
-          <a:xfrm>
-            <a:off x="9074143" y="4504235"/>
-            <a:ext cx="2279657" cy="1887374"/>
-          </a:xfrm>
-          <a:prstGeom prst="rect">
-            <a:avLst/>
-          </a:prstGeom>
-        </p:spPr>
-        <p:style>
-          <a:lnRef idx="2">
-            <a:schemeClr val="accent1">
-              <a:shade val="50000"/>
-            </a:schemeClr>
-          </a:lnRef>
-          <a:fillRef idx="1">
-            <a:schemeClr val="accent1"/>
-          </a:fillRef>
-          <a:effectRef idx="0">
-            <a:schemeClr val="accent1"/>
-          </a:effectRef>
-          <a:fontRef idx="minor">
-            <a:schemeClr val="lt1"/>
-          </a:fontRef>
-        </p:style>
-        <p:txBody>
-          <a:bodyPr rtlCol="0" anchor="ctr"/>
-          <a:lstStyle/>
-          <a:p>
-            <a:pPr algn="ctr"/>
-            <a:r>
-              <a:rPr lang="en-US" dirty="0" smtClean="0"/>
-              <a:t>Metadata Server</a:t>
-            </a:r>
-            <a:endParaRPr lang="en-US" dirty="0"/>
-          </a:p>
-        </p:txBody>
-      </p:sp>
-      <p:sp>
-        <p:nvSpPr>
-          <p:cNvPr id="13" name="Title 12"/>
-          <p:cNvSpPr>
-            <a:spLocks noGrp="1"/>
-          </p:cNvSpPr>
-          <p:nvPr>
-            <p:ph type="title"/>
-          </p:nvPr>
-        </p:nvSpPr>
-        <p:spPr/>
-        <p:txBody>
-          <a:bodyPr/>
-          <a:lstStyle/>
-          <a:p>
-            <a:r>
-              <a:rPr lang="en-US" dirty="0" smtClean="0"/>
-              <a:t>Basic Components of the Gateway App Server</a:t>
-            </a:r>
-            <a:endParaRPr lang="en-US" dirty="0"/>
-          </a:p>
-        </p:txBody>
-      </p:sp>
-      <p:sp>
-        <p:nvSpPr>
-          <p:cNvPr id="12" name="Left-Right-Up Arrow 11"/>
-          <p:cNvSpPr/>
-          <p:nvPr/>
-        </p:nvSpPr>
-        <p:spPr>
-          <a:xfrm>
-            <a:off x="3521676" y="3771400"/>
-            <a:ext cx="5165124" cy="2518190"/>
-          </a:xfrm>
-          <a:prstGeom prst="leftRightUpArrow">
-            <a:avLst>
-              <a:gd name="adj1" fmla="val 26962"/>
-              <a:gd name="adj2" fmla="val 25000"/>
-              <a:gd name="adj3" fmla="val 25000"/>
-            </a:avLst>
-          </a:prstGeom>
-        </p:spPr>
-        <p:style>
-          <a:lnRef idx="2">
-            <a:schemeClr val="accent1">
-              <a:shade val="50000"/>
-            </a:schemeClr>
-          </a:lnRef>
-          <a:fillRef idx="1">
-            <a:schemeClr val="accent1"/>
-          </a:fillRef>
-          <a:effectRef idx="0">
-            <a:schemeClr val="accent1"/>
-          </a:effectRef>
-          <a:fontRef idx="minor">
-            <a:schemeClr val="lt1"/>
-          </a:fontRef>
-        </p:style>
-        <p:txBody>
-          <a:bodyPr rtlCol="0" anchor="ctr"/>
-          <a:lstStyle/>
-          <a:p>
-            <a:pPr algn="ctr"/>
-            <a:r>
-              <a:rPr lang="en-US" dirty="0" smtClean="0"/>
-              <a:t>How do these </a:t>
-            </a:r>
-            <a:r>
-              <a:rPr lang="en-US" smtClean="0"/>
-              <a:t>services communicate?</a:t>
-            </a:r>
-            <a:endParaRPr lang="en-US"/>
-          </a:p>
-        </p:txBody>
-      </p:sp>
-    </p:spTree>
-    <p:extLst>
-      <p:ext uri="{BB962C8B-B14F-4D97-AF65-F5344CB8AC3E}">
-        <p14:creationId xmlns:p14="http://schemas.microsoft.com/office/powerpoint/2010/main" val="1497208460"/>
-      </p:ext>
-    </p:extLst>
-  </p:cSld>
-  <p:clrMapOvr>
-    <a:masterClrMapping/>
-  </p:clrMapOvr>
-  <p:timing>
-    <p:tnLst>
-      <p:par>
-        <p:cTn id="1" dur="indefinite" restart="never" nodeType="tmRoot"/>
-      </p:par>
-    </p:tnLst>
-  </p:timing>
-</p:sld>
-</file>
-
-<file path=ppt/slides/slide20.xml><?xml version="1.0" encoding="utf-8"?>
+<file path=ppt/slides/slide21.xml><?xml version="1.0" encoding="utf-8"?>
 <p:sld xmlns:a="http://schemas.openxmlformats.org/drawingml/2006/main" xmlns:r="http://schemas.openxmlformats.org/officeDocument/2006/relationships" xmlns:p="http://schemas.openxmlformats.org/presentationml/2006/main">
   <p:cSld>
     <p:spTree>
@@ -11555,106 +11218,6 @@
 </p:sld>
 </file>
 
-<file path=ppt/slides/slide21.xml><?xml version="1.0" encoding="utf-8"?>
-<p:sld xmlns:a="http://schemas.openxmlformats.org/drawingml/2006/main" xmlns:r="http://schemas.openxmlformats.org/officeDocument/2006/relationships" xmlns:p="http://schemas.openxmlformats.org/presentationml/2006/main">
-  <p:cSld>
-    <p:spTree>
-      <p:nvGrpSpPr>
-        <p:cNvPr id="1" name=""/>
-        <p:cNvGrpSpPr/>
-        <p:nvPr/>
-      </p:nvGrpSpPr>
-      <p:grpSpPr>
-        <a:xfrm>
-          <a:off x="0" y="0"/>
-          <a:ext cx="0" cy="0"/>
-          <a:chOff x="0" y="0"/>
-          <a:chExt cx="0" cy="0"/>
-        </a:xfrm>
-      </p:grpSpPr>
-      <p:sp>
-        <p:nvSpPr>
-          <p:cNvPr id="2" name="Title 1"/>
-          <p:cNvSpPr>
-            <a:spLocks noGrp="1"/>
-          </p:cNvSpPr>
-          <p:nvPr>
-            <p:ph type="ctrTitle"/>
-          </p:nvPr>
-        </p:nvSpPr>
-        <p:spPr/>
-        <p:txBody>
-          <a:bodyPr>
-            <a:normAutofit fontScale="90000"/>
-          </a:bodyPr>
-          <a:lstStyle/>
-          <a:p>
-            <a:r>
-              <a:rPr lang="en-US" dirty="0" smtClean="0"/>
-              <a:t>Some Useful Capabilities of Messaging Systems for </a:t>
-            </a:r>
-            <a:r>
-              <a:rPr lang="en-US" dirty="0" err="1" smtClean="0"/>
-              <a:t>Microservices</a:t>
-            </a:r>
-            <a:endParaRPr lang="en-US" dirty="0"/>
-          </a:p>
-        </p:txBody>
-      </p:sp>
-      <p:sp>
-        <p:nvSpPr>
-          <p:cNvPr id="3" name="Subtitle 2"/>
-          <p:cNvSpPr>
-            <a:spLocks noGrp="1"/>
-          </p:cNvSpPr>
-          <p:nvPr>
-            <p:ph type="subTitle" idx="1"/>
-          </p:nvPr>
-        </p:nvSpPr>
-        <p:spPr/>
-        <p:txBody>
-          <a:bodyPr>
-            <a:normAutofit fontScale="77500" lnSpcReduction="20000"/>
-          </a:bodyPr>
-          <a:lstStyle/>
-          <a:p>
-            <a:r>
-              <a:rPr lang="en-US" sz="3600" dirty="0" smtClean="0"/>
-              <a:t>Overarching Requirement: It should support your system’s distributed state machine</a:t>
-            </a:r>
-          </a:p>
-          <a:p>
-            <a:endParaRPr lang="en-US" sz="3600" dirty="0"/>
-          </a:p>
-          <a:p>
-            <a:r>
-              <a:rPr lang="en-US" sz="3600" b="1" i="1" dirty="0" smtClean="0"/>
-              <a:t>Let’s brainstorm some</a:t>
-            </a:r>
-            <a:endParaRPr lang="en-US" sz="3600" b="1" i="1" dirty="0"/>
-          </a:p>
-        </p:txBody>
-      </p:sp>
-    </p:spTree>
-    <p:extLst>
-      <p:ext uri="{BB962C8B-B14F-4D97-AF65-F5344CB8AC3E}">
-        <p14:creationId xmlns:p14="http://schemas.microsoft.com/office/powerpoint/2010/main" val="1916104282"/>
-      </p:ext>
-    </p:extLst>
-  </p:cSld>
-  <p:clrMapOvr>
-    <a:masterClrMapping/>
-  </p:clrMapOvr>
-  <p:timing>
-    <p:tnLst>
-      <p:par>
-        <p:cTn id="1" dur="indefinite" restart="never" nodeType="tmRoot"/>
-      </p:par>
-    </p:tnLst>
-  </p:timing>
-</p:sld>
-</file>
-
 <file path=ppt/slides/slide22.xml><?xml version="1.0" encoding="utf-8"?>
 <p:sld xmlns:a="http://schemas.openxmlformats.org/drawingml/2006/main" xmlns:r="http://schemas.openxmlformats.org/officeDocument/2006/relationships" xmlns:p="http://schemas.openxmlformats.org/presentationml/2006/main">
   <p:cSld>
@@ -11674,22 +11237,28 @@
       </p:grpSpPr>
       <p:sp>
         <p:nvSpPr>
-          <p:cNvPr id="5" name="Title 4"/>
+          <p:cNvPr id="2" name="Title 1"/>
           <p:cNvSpPr>
             <a:spLocks noGrp="1"/>
           </p:cNvSpPr>
           <p:nvPr>
-            <p:ph type="title"/>
+            <p:ph type="ctrTitle"/>
           </p:nvPr>
         </p:nvSpPr>
         <p:spPr/>
         <p:txBody>
-          <a:bodyPr/>
+          <a:bodyPr>
+            <a:normAutofit fontScale="90000"/>
+          </a:bodyPr>
           <a:lstStyle/>
           <a:p>
             <a:r>
               <a:rPr lang="en-US" dirty="0" smtClean="0"/>
-              <a:t>Useful Capabilities: My List (1/2)</a:t>
+              <a:t>Some Useful Capabilities of Messaging Systems for </a:t>
+            </a:r>
+            <a:r>
+              <a:rPr lang="en-US" dirty="0" err="1" smtClean="0"/>
+              <a:t>Microservices</a:t>
             </a:r>
             <a:endParaRPr lang="en-US" dirty="0"/>
           </a:p>
@@ -11697,99 +11266,42 @@
       </p:sp>
       <p:sp>
         <p:nvSpPr>
-          <p:cNvPr id="6" name="Content Placeholder 5"/>
+          <p:cNvPr id="3" name="Subtitle 2"/>
           <p:cNvSpPr>
             <a:spLocks noGrp="1"/>
           </p:cNvSpPr>
           <p:nvPr>
-            <p:ph idx="1"/>
+            <p:ph type="subTitle" idx="1"/>
           </p:nvPr>
         </p:nvSpPr>
         <p:spPr/>
-        <p:style>
-          <a:lnRef idx="2">
-            <a:schemeClr val="accent2">
-              <a:shade val="50000"/>
-            </a:schemeClr>
-          </a:lnRef>
-          <a:fillRef idx="1">
-            <a:schemeClr val="accent2"/>
-          </a:fillRef>
-          <a:effectRef idx="0">
-            <a:schemeClr val="accent2"/>
-          </a:effectRef>
-          <a:fontRef idx="minor">
-            <a:schemeClr val="lt1"/>
-          </a:fontRef>
-        </p:style>
         <p:txBody>
           <a:bodyPr>
-            <a:normAutofit lnSpcReduction="10000"/>
+            <a:normAutofit fontScale="77500" lnSpcReduction="20000"/>
           </a:bodyPr>
           <a:lstStyle/>
           <a:p>
             <a:r>
-              <a:rPr lang="en-US" dirty="0" smtClean="0"/>
-              <a:t>Supports both push and pull messaging</a:t>
-            </a:r>
-          </a:p>
-          <a:p>
-            <a:r>
-              <a:rPr lang="en-US" dirty="0" smtClean="0"/>
-              <a:t>Deliver messages in order</a:t>
-            </a:r>
-          </a:p>
-          <a:p>
-            <a:r>
-              <a:rPr lang="en-US" dirty="0" smtClean="0"/>
-              <a:t>Successfully delivered messages are delivered exactly once</a:t>
-            </a:r>
-          </a:p>
-          <a:p>
-            <a:pPr lvl="1"/>
-            <a:r>
-              <a:rPr lang="en-US" dirty="0" smtClean="0"/>
-              <a:t>Multiple recipients OK</a:t>
-            </a:r>
-          </a:p>
-          <a:p>
-            <a:r>
-              <a:rPr lang="en-US" dirty="0" smtClean="0"/>
-              <a:t>Deliver messages to one or more listeners based on pre-defined topics.</a:t>
-            </a:r>
-          </a:p>
-          <a:p>
-            <a:r>
-              <a:rPr lang="en-US" dirty="0" smtClean="0"/>
-              <a:t>Store messages persistently </a:t>
-            </a:r>
-          </a:p>
-          <a:p>
-            <a:pPr lvl="1"/>
-            <a:r>
-              <a:rPr lang="en-US" dirty="0" smtClean="0"/>
-              <a:t>There are no active recipients.</a:t>
-            </a:r>
-          </a:p>
-          <a:p>
-            <a:pPr lvl="1"/>
-            <a:r>
-              <a:rPr lang="en-US" dirty="0" smtClean="0"/>
-              <a:t>All recipients are busy</a:t>
-            </a:r>
-          </a:p>
-          <a:p>
-            <a:r>
-              <a:rPr lang="en-US" dirty="0" smtClean="0"/>
-              <a:t>Determine if critical messages were delivered correctly</a:t>
-            </a:r>
+              <a:rPr lang="en-US" sz="3600" dirty="0" smtClean="0"/>
+              <a:t>Overarching Requirement: It should support your system’s distributed state machine</a:t>
+            </a:r>
+          </a:p>
+          <a:p>
+            <a:endParaRPr lang="en-US" sz="3600" dirty="0"/>
+          </a:p>
+          <a:p>
+            <a:r>
+              <a:rPr lang="en-US" sz="3600" b="1" i="1" dirty="0" smtClean="0"/>
+              <a:t>Let’s brainstorm some</a:t>
+            </a:r>
+            <a:endParaRPr lang="en-US" sz="3600" b="1" i="1" dirty="0"/>
           </a:p>
         </p:txBody>
       </p:sp>
     </p:spTree>
     <p:extLst>
       <p:ext uri="{BB962C8B-B14F-4D97-AF65-F5344CB8AC3E}">
-        <p14:creationId xmlns:p14="http://schemas.microsoft.com/office/powerpoint/2010/main" val="299897162"/>
+        <p14:creationId xmlns:p14="http://schemas.microsoft.com/office/powerpoint/2010/main" val="1916104282"/>
       </p:ext>
     </p:extLst>
   </p:cSld>
@@ -11840,7 +11352,7 @@
           <a:p>
             <a:r>
               <a:rPr lang="en-US" dirty="0" smtClean="0"/>
-              <a:t>Useful Capabilities: My List (2/2)</a:t>
+              <a:t>Useful Capabilities: My List (1/2)</a:t>
             </a:r>
             <a:endParaRPr lang="en-US" dirty="0"/>
           </a:p>
@@ -11881,86 +11393,66 @@
           <a:p>
             <a:r>
               <a:rPr lang="en-US" dirty="0" smtClean="0"/>
-              <a:t>Redeliver messages that weren’t correctly received</a:t>
+              <a:t>Supports both push and pull messaging</a:t>
+            </a:r>
+          </a:p>
+          <a:p>
+            <a:r>
+              <a:rPr lang="en-US" dirty="0" smtClean="0"/>
+              <a:t>Deliver messages in order</a:t>
+            </a:r>
+          </a:p>
+          <a:p>
+            <a:r>
+              <a:rPr lang="en-US" dirty="0" smtClean="0"/>
+              <a:t>Successfully delivered messages are delivered exactly once</a:t>
             </a:r>
           </a:p>
           <a:p>
             <a:pPr lvl="1"/>
             <a:r>
               <a:rPr lang="en-US" dirty="0" smtClean="0"/>
-              <a:t>Corrupted messages, no recipients, </a:t>
-            </a:r>
-            <a:r>
-              <a:rPr lang="en-US" dirty="0" err="1" smtClean="0"/>
-              <a:t>etc</a:t>
-            </a:r>
-            <a:endParaRPr lang="en-US" dirty="0" smtClean="0"/>
+              <a:t>Multiple recipients OK</a:t>
+            </a:r>
+          </a:p>
+          <a:p>
+            <a:r>
+              <a:rPr lang="en-US" dirty="0" smtClean="0"/>
+              <a:t>Deliver messages to one or more listeners based on pre-defined topics.</a:t>
+            </a:r>
+          </a:p>
+          <a:p>
+            <a:r>
+              <a:rPr lang="en-US" dirty="0" smtClean="0"/>
+              <a:t>Store messages persistently </a:t>
+            </a:r>
           </a:p>
           <a:p>
             <a:pPr lvl="1"/>
             <a:r>
               <a:rPr lang="en-US" dirty="0" smtClean="0"/>
-              <a:t>Recipient can change</a:t>
-            </a:r>
-          </a:p>
-          <a:p>
-            <a:r>
-              <a:rPr lang="en-US" dirty="0" smtClean="0"/>
-              <a:t>Redeliver messages on request</a:t>
+              <a:t>There are no active recipients.</a:t>
             </a:r>
           </a:p>
           <a:p>
             <a:pPr lvl="1"/>
             <a:r>
               <a:rPr lang="en-US" dirty="0" smtClean="0"/>
-              <a:t>Helps clients resynch their states </a:t>
-            </a:r>
-          </a:p>
-          <a:p>
-            <a:r>
-              <a:rPr lang="en-US" dirty="0" smtClean="0"/>
-              <a:t>Allow other components to inspect message delivery metadata.</a:t>
-            </a:r>
-          </a:p>
-          <a:p>
-            <a:pPr lvl="1"/>
-            <a:r>
-              <a:rPr lang="en-US" dirty="0" smtClean="0"/>
-              <a:t>Supports elasticity, fault tolerance</a:t>
-            </a:r>
-          </a:p>
-          <a:p>
-            <a:r>
-              <a:rPr lang="en-US" dirty="0" smtClean="0"/>
-              <a:t>Priority messaging?</a:t>
-            </a:r>
-          </a:p>
-          <a:p>
-            <a:r>
-              <a:rPr lang="en-US" dirty="0" smtClean="0"/>
-              <a:t>Qualities of Service</a:t>
-            </a:r>
-          </a:p>
-          <a:p>
-            <a:pPr lvl="1"/>
-            <a:r>
-              <a:rPr lang="en-US" dirty="0"/>
-              <a:t>S</a:t>
-            </a:r>
-            <a:r>
-              <a:rPr lang="en-US" dirty="0" smtClean="0"/>
-              <a:t>ecurity, fault tolerance</a:t>
-            </a:r>
-          </a:p>
-          <a:p>
-            <a:endParaRPr lang="en-US" dirty="0"/>
+              <a:t>All recipients are busy</a:t>
+            </a:r>
+          </a:p>
+          <a:p>
+            <a:r>
+              <a:rPr lang="en-US" dirty="0" smtClean="0"/>
+              <a:t>Determine if critical messages were delivered correctly</a:t>
+            </a:r>
           </a:p>
         </p:txBody>
       </p:sp>
     </p:spTree>
     <p:extLst>
       <p:ext uri="{BB962C8B-B14F-4D97-AF65-F5344CB8AC3E}">
-        <p14:creationId xmlns:p14="http://schemas.microsoft.com/office/powerpoint/2010/main" val="227482225"/>
+        <p14:creationId xmlns:p14="http://schemas.microsoft.com/office/powerpoint/2010/main" val="299897162"/>
       </p:ext>
     </p:extLst>
   </p:cSld>
@@ -11996,7 +11488,7 @@
       </p:grpSpPr>
       <p:sp>
         <p:nvSpPr>
-          <p:cNvPr id="2" name="Title 1"/>
+          <p:cNvPr id="5" name="Title 4"/>
           <p:cNvSpPr>
             <a:spLocks noGrp="1"/>
           </p:cNvSpPr>
@@ -12011,7 +11503,7 @@
           <a:p>
             <a:r>
               <a:rPr lang="en-US" dirty="0" smtClean="0"/>
-              <a:t>Which Messaging Software to Choose?</a:t>
+              <a:t>Useful Capabilities: My List (2/2)</a:t>
             </a:r>
             <a:endParaRPr lang="en-US" dirty="0"/>
           </a:p>
@@ -12019,7 +11511,7 @@
       </p:sp>
       <p:sp>
         <p:nvSpPr>
-          <p:cNvPr id="3" name="Content Placeholder 2"/>
+          <p:cNvPr id="6" name="Content Placeholder 5"/>
           <p:cNvSpPr>
             <a:spLocks noGrp="1"/>
           </p:cNvSpPr>
@@ -12030,114 +11522,108 @@
         <p:spPr/>
         <p:style>
           <a:lnRef idx="2">
-            <a:schemeClr val="accent6">
+            <a:schemeClr val="accent2">
               <a:shade val="50000"/>
             </a:schemeClr>
           </a:lnRef>
           <a:fillRef idx="1">
-            <a:schemeClr val="accent6"/>
+            <a:schemeClr val="accent2"/>
           </a:fillRef>
           <a:effectRef idx="0">
-            <a:schemeClr val="accent6"/>
+            <a:schemeClr val="accent2"/>
           </a:effectRef>
           <a:fontRef idx="minor">
             <a:schemeClr val="lt1"/>
           </a:fontRef>
         </p:style>
         <p:txBody>
-          <a:bodyPr/>
+          <a:bodyPr>
+            <a:normAutofit lnSpcReduction="10000"/>
+          </a:bodyPr>
           <a:lstStyle/>
           <a:p>
             <a:r>
               <a:rPr lang="en-US" dirty="0" smtClean="0"/>
-              <a:t>AMQP does not cover all the capabilities listed above.</a:t>
+              <a:t>Redeliver messages that weren’t correctly received</a:t>
             </a:r>
           </a:p>
           <a:p>
             <a:pPr lvl="1"/>
             <a:r>
               <a:rPr lang="en-US" dirty="0" smtClean="0"/>
-              <a:t>It can be extended to cover these</a:t>
-            </a:r>
-            <a:r>
-              <a:rPr lang="en-US" dirty="0"/>
-              <a:t> </a:t>
-            </a:r>
-            <a:r>
-              <a:rPr lang="en-US" dirty="0" smtClean="0"/>
-              <a:t>in many cases</a:t>
-            </a:r>
-          </a:p>
-          <a:p>
-            <a:r>
-              <a:rPr lang="en-US" dirty="0" smtClean="0"/>
-              <a:t>AMQP messaging system implementations are not necessarily cloud-ready</a:t>
-            </a:r>
-          </a:p>
-          <a:p>
-            <a:pPr lvl="1"/>
-            <a:r>
-              <a:rPr lang="en-US" dirty="0" smtClean="0"/>
-              <a:t>They have to be configured as highly available services.</a:t>
-            </a:r>
-          </a:p>
-          <a:p>
-            <a:pPr lvl="2"/>
-            <a:r>
-              <a:rPr lang="en-US" dirty="0" smtClean="0"/>
-              <a:t>Primary + failover</a:t>
-            </a:r>
-          </a:p>
-          <a:p>
-            <a:pPr lvl="1"/>
-            <a:r>
-              <a:rPr lang="en-US" dirty="0" smtClean="0"/>
-              <a:t>No fancy leader elections, </a:t>
+              <a:t>Corrupted messages, no recipients, </a:t>
             </a:r>
             <a:r>
               <a:rPr lang="en-US" dirty="0" err="1" smtClean="0"/>
               <a:t>etc</a:t>
             </a:r>
-            <a:r>
-              <a:rPr lang="en-US" dirty="0" smtClean="0"/>
-              <a:t> as used in Zookeeper + </a:t>
-            </a:r>
-            <a:r>
-              <a:rPr lang="en-US" dirty="0" err="1" smtClean="0"/>
-              <a:t>Zab</a:t>
-            </a:r>
             <a:endParaRPr lang="en-US" dirty="0" smtClean="0"/>
           </a:p>
           <a:p>
             <a:pPr lvl="1"/>
             <a:r>
               <a:rPr lang="en-US" dirty="0" smtClean="0"/>
-              <a:t>Have scaling limitations, although these may not matter at our scales.</a:t>
-            </a:r>
-          </a:p>
-          <a:p>
-            <a:r>
-              <a:rPr lang="en-US" dirty="0" smtClean="0"/>
-              <a:t>Other messaging systems (Kafka, </a:t>
-            </a:r>
-            <a:r>
-              <a:rPr lang="en-US" dirty="0" err="1" smtClean="0"/>
-              <a:t>HedWig</a:t>
-            </a:r>
-            <a:r>
-              <a:rPr lang="en-US" dirty="0" smtClean="0"/>
-              <a:t>) are alternatives</a:t>
-            </a:r>
-          </a:p>
-          <a:p>
-            <a:endParaRPr lang="en-US" dirty="0" smtClean="0"/>
+              <a:t>Recipient can change</a:t>
+            </a:r>
+          </a:p>
+          <a:p>
+            <a:r>
+              <a:rPr lang="en-US" dirty="0" smtClean="0"/>
+              <a:t>Redeliver messages on request</a:t>
+            </a:r>
+          </a:p>
+          <a:p>
+            <a:pPr lvl="1"/>
+            <a:r>
+              <a:rPr lang="en-US" dirty="0" smtClean="0"/>
+              <a:t>Helps clients resynch their states </a:t>
+            </a:r>
+          </a:p>
+          <a:p>
+            <a:r>
+              <a:rPr lang="en-US" dirty="0" smtClean="0"/>
+              <a:t>Allow other components to inspect message delivery metadata.</a:t>
+            </a:r>
+          </a:p>
+          <a:p>
+            <a:pPr lvl="1"/>
+            <a:r>
+              <a:rPr lang="en-US" dirty="0" smtClean="0"/>
+              <a:t>Supports elasticity, fault tolerance</a:t>
+            </a:r>
+          </a:p>
+          <a:p>
+            <a:r>
+              <a:rPr lang="en-US" dirty="0" smtClean="0"/>
+              <a:t>Priority messaging?</a:t>
+            </a:r>
+          </a:p>
+          <a:p>
+            <a:r>
+              <a:rPr lang="en-US" dirty="0" smtClean="0"/>
+              <a:t>Qualities of Service</a:t>
+            </a:r>
+          </a:p>
+          <a:p>
+            <a:pPr lvl="1"/>
+            <a:r>
+              <a:rPr lang="en-US" dirty="0"/>
+              <a:t>S</a:t>
+            </a:r>
+            <a:r>
+              <a:rPr lang="en-US" dirty="0" smtClean="0"/>
+              <a:t>ecurity, fault tolerance</a:t>
+            </a:r>
+          </a:p>
+          <a:p>
+            <a:endParaRPr lang="en-US" dirty="0"/>
           </a:p>
         </p:txBody>
       </p:sp>
     </p:spTree>
     <p:extLst>
       <p:ext uri="{BB962C8B-B14F-4D97-AF65-F5344CB8AC3E}">
-        <p14:creationId xmlns:p14="http://schemas.microsoft.com/office/powerpoint/2010/main" val="720676991"/>
+        <p14:creationId xmlns:p14="http://schemas.microsoft.com/office/powerpoint/2010/main" val="227482225"/>
       </p:ext>
     </p:extLst>
   </p:cSld>
@@ -12178,7 +11664,7 @@
             <a:spLocks noGrp="1"/>
           </p:cNvSpPr>
           <p:nvPr>
-            <p:ph type="ctrTitle"/>
+            <p:ph type="title"/>
           </p:nvPr>
         </p:nvSpPr>
         <p:spPr/>
@@ -12188,7 +11674,7 @@
           <a:p>
             <a:r>
               <a:rPr lang="en-US" dirty="0" smtClean="0"/>
-              <a:t>Some Applications</a:t>
+              <a:t>Which Messaging Software to Choose?</a:t>
             </a:r>
             <a:endParaRPr lang="en-US" dirty="0"/>
           </a:p>
@@ -12196,27 +11682,125 @@
       </p:sp>
       <p:sp>
         <p:nvSpPr>
-          <p:cNvPr id="4" name="Subtitle 3"/>
+          <p:cNvPr id="3" name="Content Placeholder 2"/>
           <p:cNvSpPr>
             <a:spLocks noGrp="1"/>
           </p:cNvSpPr>
           <p:nvPr>
-            <p:ph type="subTitle" idx="1"/>
+            <p:ph idx="1"/>
           </p:nvPr>
         </p:nvSpPr>
         <p:spPr/>
+        <p:style>
+          <a:lnRef idx="2">
+            <a:schemeClr val="accent6">
+              <a:shade val="50000"/>
+            </a:schemeClr>
+          </a:lnRef>
+          <a:fillRef idx="1">
+            <a:schemeClr val="accent6"/>
+          </a:fillRef>
+          <a:effectRef idx="0">
+            <a:schemeClr val="accent6"/>
+          </a:effectRef>
+          <a:fontRef idx="minor">
+            <a:schemeClr val="lt1"/>
+          </a:fontRef>
+        </p:style>
         <p:txBody>
           <a:bodyPr/>
           <a:lstStyle/>
           <a:p>
-            <a:endParaRPr lang="en-US"/>
+            <a:r>
+              <a:rPr lang="en-US" dirty="0" smtClean="0"/>
+              <a:t>AMQP does not cover all the capabilities listed above.</a:t>
+            </a:r>
+          </a:p>
+          <a:p>
+            <a:pPr lvl="1"/>
+            <a:r>
+              <a:rPr lang="en-US" dirty="0" smtClean="0"/>
+              <a:t>It can be extended to cover these</a:t>
+            </a:r>
+            <a:r>
+              <a:rPr lang="en-US" dirty="0"/>
+              <a:t> </a:t>
+            </a:r>
+            <a:r>
+              <a:rPr lang="en-US" dirty="0" smtClean="0"/>
+              <a:t>in many cases</a:t>
+            </a:r>
+          </a:p>
+          <a:p>
+            <a:r>
+              <a:rPr lang="en-US" dirty="0" smtClean="0"/>
+              <a:t>AMQP messaging system implementations are not necessarily cloud-ready</a:t>
+            </a:r>
+          </a:p>
+          <a:p>
+            <a:pPr lvl="1"/>
+            <a:r>
+              <a:rPr lang="en-US" dirty="0" smtClean="0"/>
+              <a:t>They have to be configured as highly available services.</a:t>
+            </a:r>
+          </a:p>
+          <a:p>
+            <a:pPr lvl="2"/>
+            <a:r>
+              <a:rPr lang="en-US" dirty="0" smtClean="0"/>
+              <a:t>Primary + failover</a:t>
+            </a:r>
+          </a:p>
+          <a:p>
+            <a:pPr lvl="1"/>
+            <a:r>
+              <a:rPr lang="en-US" dirty="0" smtClean="0"/>
+              <a:t>No fancy leader elections, </a:t>
+            </a:r>
+            <a:r>
+              <a:rPr lang="en-US" dirty="0" err="1" smtClean="0"/>
+              <a:t>etc</a:t>
+            </a:r>
+            <a:r>
+              <a:rPr lang="en-US" dirty="0" smtClean="0"/>
+              <a:t> as used in Zookeeper + </a:t>
+            </a:r>
+            <a:r>
+              <a:rPr lang="en-US" dirty="0" err="1" smtClean="0"/>
+              <a:t>Zab</a:t>
+            </a:r>
+            <a:endParaRPr lang="en-US" dirty="0" smtClean="0"/>
+          </a:p>
+          <a:p>
+            <a:pPr lvl="1"/>
+            <a:r>
+              <a:rPr lang="en-US" dirty="0" smtClean="0"/>
+              <a:t>Have scaling limitations, although these may not matter at our scales.</a:t>
+            </a:r>
+          </a:p>
+          <a:p>
+            <a:r>
+              <a:rPr lang="en-US" dirty="0" smtClean="0"/>
+              <a:t>Other messaging systems (Kafka, </a:t>
+            </a:r>
+            <a:r>
+              <a:rPr lang="en-US" dirty="0" err="1" smtClean="0"/>
+              <a:t>HedWig</a:t>
+            </a:r>
+            <a:r>
+              <a:rPr lang="en-US" dirty="0" smtClean="0"/>
+              <a:t>) are alternatives</a:t>
+            </a:r>
+          </a:p>
+          <a:p>
+            <a:endParaRPr lang="en-US" dirty="0" smtClean="0"/>
           </a:p>
         </p:txBody>
       </p:sp>
     </p:spTree>
     <p:extLst>
       <p:ext uri="{BB962C8B-B14F-4D97-AF65-F5344CB8AC3E}">
-        <p14:creationId xmlns:p14="http://schemas.microsoft.com/office/powerpoint/2010/main" val="725644181"/>
+        <p14:creationId xmlns:p14="http://schemas.microsoft.com/office/powerpoint/2010/main" val="720676991"/>
       </p:ext>
     </p:extLst>
   </p:cSld>
@@ -12257,6 +11841,85 @@
             <a:spLocks noGrp="1"/>
           </p:cNvSpPr>
           <p:nvPr>
+            <p:ph type="ctrTitle"/>
+          </p:nvPr>
+        </p:nvSpPr>
+        <p:spPr/>
+        <p:txBody>
+          <a:bodyPr/>
+          <a:lstStyle/>
+          <a:p>
+            <a:r>
+              <a:rPr lang="en-US" dirty="0" smtClean="0"/>
+              <a:t>Some Applications</a:t>
+            </a:r>
+            <a:endParaRPr lang="en-US" dirty="0"/>
+          </a:p>
+        </p:txBody>
+      </p:sp>
+      <p:sp>
+        <p:nvSpPr>
+          <p:cNvPr id="4" name="Subtitle 3"/>
+          <p:cNvSpPr>
+            <a:spLocks noGrp="1"/>
+          </p:cNvSpPr>
+          <p:nvPr>
+            <p:ph type="subTitle" idx="1"/>
+          </p:nvPr>
+        </p:nvSpPr>
+        <p:spPr/>
+        <p:txBody>
+          <a:bodyPr/>
+          <a:lstStyle/>
+          <a:p>
+            <a:endParaRPr lang="en-US"/>
+          </a:p>
+        </p:txBody>
+      </p:sp>
+    </p:spTree>
+    <p:extLst>
+      <p:ext uri="{BB962C8B-B14F-4D97-AF65-F5344CB8AC3E}">
+        <p14:creationId xmlns:p14="http://schemas.microsoft.com/office/powerpoint/2010/main" val="725644181"/>
+      </p:ext>
+    </p:extLst>
+  </p:cSld>
+  <p:clrMapOvr>
+    <a:masterClrMapping/>
+  </p:clrMapOvr>
+  <p:timing>
+    <p:tnLst>
+      <p:par>
+        <p:cTn id="1" dur="indefinite" restart="never" nodeType="tmRoot"/>
+      </p:par>
+    </p:tnLst>
+  </p:timing>
+</p:sld>
+</file>
+
+<file path=ppt/slides/slide27.xml><?xml version="1.0" encoding="utf-8"?>
+<p:sld xmlns:a="http://schemas.openxmlformats.org/drawingml/2006/main" xmlns:r="http://schemas.openxmlformats.org/officeDocument/2006/relationships" xmlns:p="http://schemas.openxmlformats.org/presentationml/2006/main">
+  <p:cSld>
+    <p:spTree>
+      <p:nvGrpSpPr>
+        <p:cNvPr id="1" name=""/>
+        <p:cNvGrpSpPr/>
+        <p:nvPr/>
+      </p:nvGrpSpPr>
+      <p:grpSpPr>
+        <a:xfrm>
+          <a:off x="0" y="0"/>
+          <a:ext cx="0" cy="0"/>
+          <a:chOff x="0" y="0"/>
+          <a:chExt cx="0" cy="0"/>
+        </a:xfrm>
+      </p:grpSpPr>
+      <p:sp>
+        <p:nvSpPr>
+          <p:cNvPr id="2" name="Title 1"/>
+          <p:cNvSpPr>
+            <a:spLocks noGrp="1"/>
+          </p:cNvSpPr>
+          <p:nvPr>
             <p:ph type="title"/>
           </p:nvPr>
         </p:nvSpPr>
@@ -12378,7 +12041,7 @@
 </p:sld>
 </file>
 
-<file path=ppt/slides/slide27.xml><?xml version="1.0" encoding="utf-8"?>
+<file path=ppt/slides/slide28.xml><?xml version="1.0" encoding="utf-8"?>
 <p:sld xmlns:a="http://schemas.openxmlformats.org/drawingml/2006/main" xmlns:r="http://schemas.openxmlformats.org/officeDocument/2006/relationships" xmlns:p="http://schemas.openxmlformats.org/presentationml/2006/main">
   <p:cSld>
     <p:spTree>
@@ -13268,121 +12931,6 @@
 </p:sld>
 </file>
 
-<file path=ppt/slides/slide28.xml><?xml version="1.0" encoding="utf-8"?>
-<p:sld xmlns:a="http://schemas.openxmlformats.org/drawingml/2006/main" xmlns:r="http://schemas.openxmlformats.org/officeDocument/2006/relationships" xmlns:p="http://schemas.openxmlformats.org/presentationml/2006/main">
-  <p:cSld>
-    <p:spTree>
-      <p:nvGrpSpPr>
-        <p:cNvPr id="1" name=""/>
-        <p:cNvGrpSpPr/>
-        <p:nvPr/>
-      </p:nvGrpSpPr>
-      <p:grpSpPr>
-        <a:xfrm>
-          <a:off x="0" y="0"/>
-          <a:ext cx="0" cy="0"/>
-          <a:chOff x="0" y="0"/>
-          <a:chExt cx="0" cy="0"/>
-        </a:xfrm>
-      </p:grpSpPr>
-      <p:sp>
-        <p:nvSpPr>
-          <p:cNvPr id="2" name="Title 1"/>
-          <p:cNvSpPr>
-            <a:spLocks noGrp="1"/>
-          </p:cNvSpPr>
-          <p:nvPr>
-            <p:ph type="title"/>
-          </p:nvPr>
-        </p:nvSpPr>
-        <p:spPr/>
-        <p:txBody>
-          <a:bodyPr/>
-          <a:lstStyle/>
-          <a:p>
-            <a:r>
-              <a:rPr lang="en-US" dirty="0" smtClean="0"/>
-              <a:t>What Could Possibly Go Wrong?</a:t>
-            </a:r>
-            <a:endParaRPr lang="en-US" dirty="0"/>
-          </a:p>
-        </p:txBody>
-      </p:sp>
-      <p:sp>
-        <p:nvSpPr>
-          <p:cNvPr id="3" name="Content Placeholder 2"/>
-          <p:cNvSpPr>
-            <a:spLocks noGrp="1"/>
-          </p:cNvSpPr>
-          <p:nvPr>
-            <p:ph idx="1"/>
-          </p:nvPr>
-        </p:nvSpPr>
-        <p:spPr/>
-        <p:txBody>
-          <a:bodyPr/>
-          <a:lstStyle/>
-          <a:p>
-            <a:r>
-              <a:rPr lang="en-US" dirty="0" smtClean="0"/>
-              <a:t>Jobs take a long time to finish, so ACKs may not come for hours.</a:t>
-            </a:r>
-          </a:p>
-          <a:p>
-            <a:pPr lvl="1"/>
-            <a:r>
-              <a:rPr lang="en-US" dirty="0" smtClean="0"/>
-              <a:t>Durable connections needed between Consumers and Message Queues</a:t>
-            </a:r>
-          </a:p>
-          <a:p>
-            <a:pPr lvl="1"/>
-            <a:r>
-              <a:rPr lang="en-US" dirty="0" smtClean="0"/>
-              <a:t>Alternatively, the ACK could come from a different process</a:t>
-            </a:r>
-          </a:p>
-          <a:p>
-            <a:r>
-              <a:rPr lang="en-US" dirty="0" smtClean="0"/>
-              <a:t>Jobs may actually get launched on the external supercomputer, so you don’t want to launch twice just because of a missing ACK</a:t>
-            </a:r>
-          </a:p>
-          <a:p>
-            <a:r>
-              <a:rPr lang="en-US" dirty="0" smtClean="0"/>
-              <a:t>Clients have to implement their own queues</a:t>
-            </a:r>
-          </a:p>
-          <a:p>
-            <a:pPr lvl="1"/>
-            <a:r>
-              <a:rPr lang="en-US" dirty="0" smtClean="0"/>
-              <a:t>Could get another work request while doing work.</a:t>
-            </a:r>
-          </a:p>
-        </p:txBody>
-      </p:sp>
-    </p:spTree>
-    <p:extLst>
-      <p:ext uri="{BB962C8B-B14F-4D97-AF65-F5344CB8AC3E}">
-        <p14:creationId xmlns:p14="http://schemas.microsoft.com/office/powerpoint/2010/main" val="393968778"/>
-      </p:ext>
-    </p:extLst>
-  </p:cSld>
-  <p:clrMapOvr>
-    <a:masterClrMapping/>
-  </p:clrMapOvr>
-  <p:timing>
-    <p:tnLst>
-      <p:par>
-        <p:cTn id="1" dur="indefinite" restart="never" nodeType="tmRoot"/>
-      </p:par>
-    </p:tnLst>
-  </p:timing>
-</p:sld>
-</file>
-
 <file path=ppt/slides/slide29.xml><?xml version="1.0" encoding="utf-8"?>
 <p:sld xmlns:a="http://schemas.openxmlformats.org/drawingml/2006/main" xmlns:r="http://schemas.openxmlformats.org/officeDocument/2006/relationships" xmlns:p="http://schemas.openxmlformats.org/presentationml/2006/main">
   <p:cSld>
@@ -13417,7 +12965,7 @@
           <a:p>
             <a:r>
               <a:rPr lang="en-US" dirty="0" smtClean="0"/>
-              <a:t>Work Queue, Take Two</a:t>
+              <a:t>What Could Possibly Go Wrong?</a:t>
             </a:r>
             <a:endParaRPr lang="en-US" dirty="0"/>
           </a:p>
@@ -13435,98 +12983,45 @@
         </p:nvSpPr>
         <p:spPr/>
         <p:txBody>
-          <a:bodyPr>
-            <a:normAutofit fontScale="92500" lnSpcReduction="20000"/>
-          </a:bodyPr>
+          <a:bodyPr/>
           <a:lstStyle/>
           <a:p>
             <a:r>
               <a:rPr lang="en-US" dirty="0" smtClean="0"/>
-              <a:t>Orchestrator pushes work into a queue.</a:t>
-            </a:r>
-          </a:p>
-          <a:p>
-            <a:r>
-              <a:rPr lang="en-US" dirty="0" smtClean="0"/>
-              <a:t>Have workers request work when they are not busy.</a:t>
+              <a:t>Jobs take a long time to finish, so ACKs may not come for hours.</a:t>
             </a:r>
           </a:p>
           <a:p>
             <a:pPr lvl="1"/>
             <a:r>
-              <a:rPr lang="en-US" dirty="0" err="1" smtClean="0"/>
-              <a:t>RabbitMQ</a:t>
-            </a:r>
-            <a:r>
-              <a:rPr lang="en-US" dirty="0" smtClean="0"/>
-              <a:t> supports this as “</a:t>
-            </a:r>
-            <a:r>
-              <a:rPr lang="en-US" dirty="0" err="1" smtClean="0"/>
-              <a:t>prefetchCount</a:t>
-            </a:r>
-            <a:r>
-              <a:rPr lang="en-US" dirty="0" smtClean="0"/>
-              <a:t>”</a:t>
+              <a:rPr lang="en-US" dirty="0" smtClean="0"/>
+              <a:t>Durable connections needed between Consumers and Message Queues</a:t>
             </a:r>
           </a:p>
           <a:p>
             <a:pPr lvl="1"/>
             <a:r>
               <a:rPr lang="en-US" dirty="0" smtClean="0"/>
-              <a:t>Use round-robin but don’t send work to busy workers with outstanding ACKs.</a:t>
+              <a:t>Alternatively, the ACK could come from a different process</a:t>
+            </a:r>
+          </a:p>
+          <a:p>
+            <a:r>
+              <a:rPr lang="en-US" dirty="0" smtClean="0"/>
+              <a:t>Jobs may actually get launched on the external supercomputer, so you don’t want to launch twice just because of a missing ACK</a:t>
+            </a:r>
+          </a:p>
+          <a:p>
+            <a:r>
+              <a:rPr lang="en-US" dirty="0" smtClean="0"/>
+              <a:t>Clients have to implement their own queues</a:t>
             </a:r>
           </a:p>
           <a:p>
             <a:pPr lvl="1"/>
             <a:r>
               <a:rPr lang="en-US" dirty="0" smtClean="0"/>
-              <a:t>Workers do not receive work requests when they are busy.</a:t>
-            </a:r>
-          </a:p>
-          <a:p>
-            <a:r>
-              <a:rPr lang="en-US" dirty="0" smtClean="0"/>
-              <a:t>Worker sends ACK after successfully submitting the job.</a:t>
-            </a:r>
-          </a:p>
-          <a:p>
-            <a:pPr lvl="1"/>
-            <a:r>
-              <a:rPr lang="en-US" dirty="0" smtClean="0"/>
-              <a:t>This only means the job has been submitted</a:t>
-            </a:r>
-          </a:p>
-          <a:p>
-            <a:pPr lvl="1"/>
-            <a:r>
-              <a:rPr lang="en-US" dirty="0" smtClean="0"/>
-              <a:t>Worker can take more work</a:t>
-            </a:r>
-          </a:p>
-          <a:p>
-            <a:r>
-              <a:rPr lang="en-US" dirty="0" smtClean="0"/>
-              <a:t>A separate process handles the state changes on the supercomputer</a:t>
-            </a:r>
-          </a:p>
-          <a:p>
-            <a:pPr lvl="1"/>
-            <a:r>
-              <a:rPr lang="en-US" dirty="0" smtClean="0"/>
-              <a:t>Publishes ”queued”, “executing”, ”completed” or “failed” messages</a:t>
-            </a:r>
-          </a:p>
-          <a:p>
-            <a:r>
-              <a:rPr lang="en-US" dirty="0" smtClean="0"/>
-              <a:t>When job is done, Orchestrator creates a “cleanup” job</a:t>
-            </a:r>
-          </a:p>
-          <a:p>
-            <a:r>
-              <a:rPr lang="en-US" dirty="0" smtClean="0"/>
-              <a:t>Any worker available can take this.</a:t>
+              <a:t>Could get another work request while doing work.</a:t>
             </a:r>
           </a:p>
         </p:txBody>
@@ -13534,7 +13029,7 @@
     </p:spTree>
     <p:extLst>
       <p:ext uri="{BB962C8B-B14F-4D97-AF65-F5344CB8AC3E}">
-        <p14:creationId xmlns:p14="http://schemas.microsoft.com/office/powerpoint/2010/main" val="741168145"/>
+        <p14:creationId xmlns:p14="http://schemas.microsoft.com/office/powerpoint/2010/main" val="393968778"/>
       </p:ext>
     </p:extLst>
   </p:cSld>
@@ -14587,6 +14082,174 @@
 </file>
 
 <file path=ppt/slides/slide30.xml><?xml version="1.0" encoding="utf-8"?>
+<p:sld xmlns:a="http://schemas.openxmlformats.org/drawingml/2006/main" xmlns:r="http://schemas.openxmlformats.org/officeDocument/2006/relationships" xmlns:p="http://schemas.openxmlformats.org/presentationml/2006/main">
+  <p:cSld>
+    <p:spTree>
+      <p:nvGrpSpPr>
+        <p:cNvPr id="1" name=""/>
+        <p:cNvGrpSpPr/>
+        <p:nvPr/>
+      </p:nvGrpSpPr>
+      <p:grpSpPr>
+        <a:xfrm>
+          <a:off x="0" y="0"/>
+          <a:ext cx="0" cy="0"/>
+          <a:chOff x="0" y="0"/>
+          <a:chExt cx="0" cy="0"/>
+        </a:xfrm>
+      </p:grpSpPr>
+      <p:sp>
+        <p:nvSpPr>
+          <p:cNvPr id="2" name="Title 1"/>
+          <p:cNvSpPr>
+            <a:spLocks noGrp="1"/>
+          </p:cNvSpPr>
+          <p:nvPr>
+            <p:ph type="title"/>
+          </p:nvPr>
+        </p:nvSpPr>
+        <p:spPr/>
+        <p:txBody>
+          <a:bodyPr/>
+          <a:lstStyle/>
+          <a:p>
+            <a:r>
+              <a:rPr lang="en-US" dirty="0" smtClean="0"/>
+              <a:t>Work Queue, Take Two</a:t>
+            </a:r>
+            <a:endParaRPr lang="en-US" dirty="0"/>
+          </a:p>
+        </p:txBody>
+      </p:sp>
+      <p:sp>
+        <p:nvSpPr>
+          <p:cNvPr id="3" name="Content Placeholder 2"/>
+          <p:cNvSpPr>
+            <a:spLocks noGrp="1"/>
+          </p:cNvSpPr>
+          <p:nvPr>
+            <p:ph idx="1"/>
+          </p:nvPr>
+        </p:nvSpPr>
+        <p:spPr/>
+        <p:txBody>
+          <a:bodyPr>
+            <a:normAutofit fontScale="92500" lnSpcReduction="20000"/>
+          </a:bodyPr>
+          <a:lstStyle/>
+          <a:p>
+            <a:r>
+              <a:rPr lang="en-US" dirty="0" smtClean="0"/>
+              <a:t>Orchestrator pushes work into a queue.</a:t>
+            </a:r>
+          </a:p>
+          <a:p>
+            <a:r>
+              <a:rPr lang="en-US" dirty="0" smtClean="0"/>
+              <a:t>Have workers request work when they are not busy.</a:t>
+            </a:r>
+          </a:p>
+          <a:p>
+            <a:pPr lvl="1"/>
+            <a:r>
+              <a:rPr lang="en-US" dirty="0" err="1" smtClean="0"/>
+              <a:t>RabbitMQ</a:t>
+            </a:r>
+            <a:r>
+              <a:rPr lang="en-US" dirty="0" smtClean="0"/>
+              <a:t> supports this as “</a:t>
+            </a:r>
+            <a:r>
+              <a:rPr lang="en-US" dirty="0" err="1" smtClean="0"/>
+              <a:t>prefetchCount</a:t>
+            </a:r>
+            <a:r>
+              <a:rPr lang="en-US" dirty="0" smtClean="0"/>
+              <a:t>”</a:t>
+            </a:r>
+          </a:p>
+          <a:p>
+            <a:pPr lvl="1"/>
+            <a:r>
+              <a:rPr lang="en-US" dirty="0" smtClean="0"/>
+              <a:t>Use round-robin but don’t send work to busy workers with outstanding ACKs.</a:t>
+            </a:r>
+          </a:p>
+          <a:p>
+            <a:pPr lvl="1"/>
+            <a:r>
+              <a:rPr lang="en-US" dirty="0" smtClean="0"/>
+              <a:t>Workers do not receive work requests when they are busy.</a:t>
+            </a:r>
+          </a:p>
+          <a:p>
+            <a:r>
+              <a:rPr lang="en-US" dirty="0" smtClean="0"/>
+              <a:t>Worker sends ACK after successfully submitting the job.</a:t>
+            </a:r>
+          </a:p>
+          <a:p>
+            <a:pPr lvl="1"/>
+            <a:r>
+              <a:rPr lang="en-US" dirty="0" smtClean="0"/>
+              <a:t>This only means the job has been submitted</a:t>
+            </a:r>
+          </a:p>
+          <a:p>
+            <a:pPr lvl="1"/>
+            <a:r>
+              <a:rPr lang="en-US" dirty="0" smtClean="0"/>
+              <a:t>Worker can take more work</a:t>
+            </a:r>
+          </a:p>
+          <a:p>
+            <a:r>
+              <a:rPr lang="en-US" dirty="0" smtClean="0"/>
+              <a:t>A separate process handles the state changes on the supercomputer</a:t>
+            </a:r>
+          </a:p>
+          <a:p>
+            <a:pPr lvl="1"/>
+            <a:r>
+              <a:rPr lang="en-US" dirty="0" smtClean="0"/>
+              <a:t>Publishes ”queued”, “executing”, ”completed” or “failed” messages</a:t>
+            </a:r>
+          </a:p>
+          <a:p>
+            <a:r>
+              <a:rPr lang="en-US" dirty="0" smtClean="0"/>
+              <a:t>When job is done, Orchestrator creates a “cleanup” job</a:t>
+            </a:r>
+          </a:p>
+          <a:p>
+            <a:r>
+              <a:rPr lang="en-US" dirty="0" smtClean="0"/>
+              <a:t>Any worker available can take this.</a:t>
+            </a:r>
+          </a:p>
+        </p:txBody>
+      </p:sp>
+    </p:spTree>
+    <p:extLst>
+      <p:ext uri="{BB962C8B-B14F-4D97-AF65-F5344CB8AC3E}">
+        <p14:creationId xmlns:p14="http://schemas.microsoft.com/office/powerpoint/2010/main" val="741168145"/>
+      </p:ext>
+    </p:extLst>
+  </p:cSld>
+  <p:clrMapOvr>
+    <a:masterClrMapping/>
+  </p:clrMapOvr>
+  <p:timing>
+    <p:tnLst>
+      <p:par>
+        <p:cTn id="1" dur="indefinite" restart="never" nodeType="tmRoot"/>
+      </p:par>
+    </p:tnLst>
+  </p:timing>
+</p:sld>
+</file>
+
+<file path=ppt/slides/slide31.xml><?xml version="1.0" encoding="utf-8"?>
 <p:sld xmlns:a="http://schemas.openxmlformats.org/drawingml/2006/main" xmlns:r="http://schemas.openxmlformats.org/officeDocument/2006/relationships" xmlns:p="http://schemas.openxmlformats.org/presentationml/2006/main">
   <p:cSld>
     <p:spTree>
@@ -15553,7 +15216,7 @@
 </p:sld>
 </file>
 
-<file path=ppt/slides/slide31.xml><?xml version="1.0" encoding="utf-8"?>
+<file path=ppt/slides/slide32.xml><?xml version="1.0" encoding="utf-8"?>
 <p:sld xmlns:a="http://schemas.openxmlformats.org/drawingml/2006/main" xmlns:r="http://schemas.openxmlformats.org/officeDocument/2006/relationships" xmlns:p="http://schemas.openxmlformats.org/presentationml/2006/main">
   <p:cSld>
     <p:spTree>
@@ -15717,7 +15380,7 @@
 </p:sld>
 </file>
 
-<file path=ppt/slides/slide32.xml><?xml version="1.0" encoding="utf-8"?>
+<file path=ppt/slides/slide33.xml><?xml version="1.0" encoding="utf-8"?>
 <p:sld xmlns:a="http://schemas.openxmlformats.org/drawingml/2006/main" xmlns:r="http://schemas.openxmlformats.org/officeDocument/2006/relationships" xmlns:p="http://schemas.openxmlformats.org/presentationml/2006/main">
   <p:cSld>
     <p:spTree>
@@ -15864,7 +15527,7 @@
 </p:sld>
 </file>
 
-<file path=ppt/slides/slide33.xml><?xml version="1.0" encoding="utf-8"?>
+<file path=ppt/slides/slide34.xml><?xml version="1.0" encoding="utf-8"?>
 <p:sld xmlns:a="http://schemas.openxmlformats.org/drawingml/2006/main" xmlns:r="http://schemas.openxmlformats.org/officeDocument/2006/relationships" xmlns:p="http://schemas.openxmlformats.org/presentationml/2006/main">
   <p:cSld>
     <p:spTree>
@@ -16758,6 +16421,129 @@
       </p:grpSpPr>
       <p:sp>
         <p:nvSpPr>
+          <p:cNvPr id="3" name="Title 2"/>
+          <p:cNvSpPr>
+            <a:spLocks noGrp="1"/>
+          </p:cNvSpPr>
+          <p:nvPr>
+            <p:ph type="title"/>
+          </p:nvPr>
+        </p:nvSpPr>
+        <p:spPr/>
+        <p:txBody>
+          <a:bodyPr/>
+          <a:lstStyle/>
+          <a:p>
+            <a:r>
+              <a:rPr lang="en-US" dirty="0" smtClean="0"/>
+              <a:t>Messaging Summary</a:t>
+            </a:r>
+            <a:endParaRPr lang="en-US" dirty="0"/>
+          </a:p>
+        </p:txBody>
+      </p:sp>
+      <p:sp>
+        <p:nvSpPr>
+          <p:cNvPr id="4" name="Content Placeholder 3"/>
+          <p:cNvSpPr>
+            <a:spLocks noGrp="1"/>
+          </p:cNvSpPr>
+          <p:nvPr>
+            <p:ph idx="1"/>
+          </p:nvPr>
+        </p:nvSpPr>
+        <p:spPr/>
+        <p:txBody>
+          <a:bodyPr/>
+          <a:lstStyle/>
+          <a:p>
+            <a:r>
+              <a:rPr lang="en-US" dirty="0" smtClean="0"/>
+              <a:t>Review </a:t>
+            </a:r>
+            <a:r>
+              <a:rPr lang="en-US" dirty="0" err="1" smtClean="0"/>
+              <a:t>RabbitMQ’s</a:t>
+            </a:r>
+            <a:r>
+              <a:rPr lang="en-US" dirty="0" smtClean="0"/>
+              <a:t> wonderful set of tutorials for several programming languages.</a:t>
+            </a:r>
+          </a:p>
+          <a:p>
+            <a:pPr lvl="1"/>
+            <a:r>
+              <a:rPr lang="en-US" dirty="0">
+                <a:hlinkClick r:id="rId2"/>
+              </a:rPr>
+              <a:t>https://</a:t>
+            </a:r>
+            <a:r>
+              <a:rPr lang="en-US" dirty="0" smtClean="0">
+                <a:hlinkClick r:id="rId2"/>
+              </a:rPr>
+              <a:t>www.rabbitmq.com/getstarted.html</a:t>
+            </a:r>
+            <a:endParaRPr lang="en-US" dirty="0" smtClean="0"/>
+          </a:p>
+          <a:p>
+            <a:r>
+              <a:rPr lang="en-US" dirty="0" err="1" smtClean="0"/>
+              <a:t>RabbitMQ</a:t>
+            </a:r>
+            <a:r>
+              <a:rPr lang="en-US" dirty="0"/>
+              <a:t> </a:t>
+            </a:r>
+            <a:r>
+              <a:rPr lang="en-US" dirty="0" smtClean="0"/>
+              <a:t>implements some basic AMQP patterns out of the box.</a:t>
+            </a:r>
+          </a:p>
+          <a:p>
+            <a:pPr lvl="1"/>
+            <a:r>
+              <a:rPr lang="en-US" dirty="0" smtClean="0"/>
+              <a:t>You don’t need to understand the full power and flexibility of AMQP-based systems to use messaging.</a:t>
+            </a:r>
+          </a:p>
+          <a:p>
+            <a:endParaRPr lang="en-US" dirty="0" smtClean="0"/>
+          </a:p>
+        </p:txBody>
+      </p:sp>
+    </p:spTree>
+    <p:extLst>
+      <p:ext uri="{BB962C8B-B14F-4D97-AF65-F5344CB8AC3E}">
+        <p14:creationId xmlns:p14="http://schemas.microsoft.com/office/powerpoint/2010/main" val="1703002587"/>
+      </p:ext>
+    </p:extLst>
+  </p:cSld>
+  <p:clrMapOvr>
+    <a:masterClrMapping/>
+  </p:clrMapOvr>
+</p:sld>
+</file>
+
+<file path=ppt/slides/slide7.xml><?xml version="1.0" encoding="utf-8"?>
+<p:sld xmlns:a="http://schemas.openxmlformats.org/drawingml/2006/main" xmlns:r="http://schemas.openxmlformats.org/officeDocument/2006/relationships" xmlns:p="http://schemas.openxmlformats.org/presentationml/2006/main">
+  <p:cSld>
+    <p:spTree>
+      <p:nvGrpSpPr>
+        <p:cNvPr id="1" name=""/>
+        <p:cNvGrpSpPr/>
+        <p:nvPr/>
+      </p:nvGrpSpPr>
+      <p:grpSpPr>
+        <a:xfrm>
+          <a:off x="0" y="0"/>
+          <a:ext cx="0" cy="0"/>
+          <a:chOff x="0" y="0"/>
+          <a:chExt cx="0" cy="0"/>
+        </a:xfrm>
+      </p:grpSpPr>
+      <p:sp>
+        <p:nvSpPr>
           <p:cNvPr id="2" name="Title 1"/>
           <p:cNvSpPr>
             <a:spLocks noGrp="1"/>
@@ -16998,7 +16784,7 @@
 </p:sld>
 </file>
 
-<file path=ppt/slides/slide7.xml><?xml version="1.0" encoding="utf-8"?>
+<file path=ppt/slides/slide8.xml><?xml version="1.0" encoding="utf-8"?>
 <p:sld xmlns:a="http://schemas.openxmlformats.org/drawingml/2006/main" xmlns:r="http://schemas.openxmlformats.org/officeDocument/2006/relationships" xmlns:p="http://schemas.openxmlformats.org/presentationml/2006/main">
   <p:cSld>
     <p:spTree>
@@ -17136,7 +16922,7 @@
 </p:sld>
 </file>
 
-<file path=ppt/slides/slide8.xml><?xml version="1.0" encoding="utf-8"?>
+<file path=ppt/slides/slide9.xml><?xml version="1.0" encoding="utf-8"?>
 <p:sld xmlns:a="http://schemas.openxmlformats.org/drawingml/2006/main" xmlns:r="http://schemas.openxmlformats.org/officeDocument/2006/relationships" xmlns:p="http://schemas.openxmlformats.org/presentationml/2006/main">
   <p:cSld>
     <p:spTree>
@@ -17209,91 +16995,6 @@
     <p:extLst>
       <p:ext uri="{BB962C8B-B14F-4D97-AF65-F5344CB8AC3E}">
         <p14:creationId xmlns:p14="http://schemas.microsoft.com/office/powerpoint/2010/main" val="178915584"/>
-      </p:ext>
-    </p:extLst>
-  </p:cSld>
-  <p:clrMapOvr>
-    <a:masterClrMapping/>
-  </p:clrMapOvr>
-  <p:timing>
-    <p:tnLst>
-      <p:par>
-        <p:cTn id="1" dur="indefinite" restart="never" nodeType="tmRoot"/>
-      </p:par>
-    </p:tnLst>
-  </p:timing>
-</p:sld>
-</file>
-
-<file path=ppt/slides/slide9.xml><?xml version="1.0" encoding="utf-8"?>
-<p:sld xmlns:a="http://schemas.openxmlformats.org/drawingml/2006/main" xmlns:r="http://schemas.openxmlformats.org/officeDocument/2006/relationships" xmlns:p="http://schemas.openxmlformats.org/presentationml/2006/main">
-  <p:cSld>
-    <p:spTree>
-      <p:nvGrpSpPr>
-        <p:cNvPr id="1" name=""/>
-        <p:cNvGrpSpPr/>
-        <p:nvPr/>
-      </p:nvGrpSpPr>
-      <p:grpSpPr>
-        <a:xfrm>
-          <a:off x="0" y="0"/>
-          <a:ext cx="0" cy="0"/>
-          <a:chOff x="0" y="0"/>
-          <a:chExt cx="0" cy="0"/>
-        </a:xfrm>
-      </p:grpSpPr>
-      <p:sp>
-        <p:nvSpPr>
-          <p:cNvPr id="3" name="Title 2"/>
-          <p:cNvSpPr>
-            <a:spLocks noGrp="1"/>
-          </p:cNvSpPr>
-          <p:nvPr>
-            <p:ph type="title"/>
-          </p:nvPr>
-        </p:nvSpPr>
-        <p:spPr/>
-        <p:txBody>
-          <a:bodyPr/>
-          <a:lstStyle/>
-          <a:p>
-            <a:r>
-              <a:rPr lang="en-US" dirty="0" smtClean="0"/>
-              <a:t>An AMQP Server (or Broker)</a:t>
-            </a:r>
-            <a:endParaRPr lang="en-US" dirty="0"/>
-          </a:p>
-        </p:txBody>
-      </p:sp>
-      <p:graphicFrame>
-        <p:nvGraphicFramePr>
-          <p:cNvPr id="2" name="Content Placeholder 1"/>
-          <p:cNvGraphicFramePr>
-            <a:graphicFrameLocks noGrp="1"/>
-          </p:cNvGraphicFramePr>
-          <p:nvPr>
-            <p:ph idx="1"/>
-            <p:extLst>
-              <p:ext uri="{D42A27DB-BD31-4B8C-83A1-F6EECF244321}">
-                <p14:modId xmlns:p14="http://schemas.microsoft.com/office/powerpoint/2010/main" val="2045070950"/>
-              </p:ext>
-            </p:extLst>
-          </p:nvPr>
-        </p:nvGraphicFramePr>
-        <p:xfrm>
-          <a:off x="838200" y="1825625"/>
-          <a:ext cx="10515600" cy="4351338"/>
-        </p:xfrm>
-        <a:graphic>
-          <a:graphicData uri="http://schemas.openxmlformats.org/drawingml/2006/diagram">
-            <dgm:relIds xmlns:dgm="http://schemas.openxmlformats.org/drawingml/2006/diagram" xmlns:r="http://schemas.openxmlformats.org/officeDocument/2006/relationships" r:dm="rId2" r:lo="rId3" r:qs="rId4" r:cs="rId5"/>
-          </a:graphicData>
-        </a:graphic>
-      </p:graphicFrame>
-    </p:spTree>
-    <p:extLst>
-      <p:ext uri="{BB962C8B-B14F-4D97-AF65-F5344CB8AC3E}">
-        <p14:creationId xmlns:p14="http://schemas.microsoft.com/office/powerpoint/2010/main" val="557114488"/>
       </p:ext>
     </p:extLst>
   </p:cSld>

</xml_diff>